<commit_message>
Updated Pagerank according to Ana's comments
Signed-off-by: Zack Ives <zives@cis.upenn.edu>
</commit_message>
<xml_diff>
--- a/opends4all-resources/opends4all-scalable-data-processing/GRAPHS-PAGERANK-centrality.pptx
+++ b/opends4all-resources/opends4all-scalable-data-processing/GRAPHS-PAGERANK-centrality.pptx
@@ -5,10 +5,10 @@
     <p:sldMasterId id="2147483660" r:id="rId1"/>
   </p:sldMasterIdLst>
   <p:notesMasterIdLst>
-    <p:notesMasterId r:id="rId24"/>
+    <p:notesMasterId r:id="rId23"/>
   </p:notesMasterIdLst>
   <p:handoutMasterIdLst>
-    <p:handoutMasterId r:id="rId25"/>
+    <p:handoutMasterId r:id="rId24"/>
   </p:handoutMasterIdLst>
   <p:sldIdLst>
     <p:sldId id="901" r:id="rId2"/>
@@ -20,19 +20,18 @@
     <p:sldId id="1154" r:id="rId8"/>
     <p:sldId id="972" r:id="rId9"/>
     <p:sldId id="1215" r:id="rId10"/>
-    <p:sldId id="1220" r:id="rId11"/>
-    <p:sldId id="1222" r:id="rId12"/>
-    <p:sldId id="1223" r:id="rId13"/>
-    <p:sldId id="973" r:id="rId14"/>
-    <p:sldId id="1009" r:id="rId15"/>
-    <p:sldId id="1010" r:id="rId16"/>
-    <p:sldId id="975" r:id="rId17"/>
-    <p:sldId id="1219" r:id="rId18"/>
-    <p:sldId id="976" r:id="rId19"/>
-    <p:sldId id="977" r:id="rId20"/>
-    <p:sldId id="978" r:id="rId21"/>
-    <p:sldId id="979" r:id="rId22"/>
-    <p:sldId id="1027" r:id="rId23"/>
+    <p:sldId id="1223" r:id="rId11"/>
+    <p:sldId id="1224" r:id="rId12"/>
+    <p:sldId id="973" r:id="rId13"/>
+    <p:sldId id="1009" r:id="rId14"/>
+    <p:sldId id="1010" r:id="rId15"/>
+    <p:sldId id="975" r:id="rId16"/>
+    <p:sldId id="1219" r:id="rId17"/>
+    <p:sldId id="976" r:id="rId18"/>
+    <p:sldId id="977" r:id="rId19"/>
+    <p:sldId id="978" r:id="rId20"/>
+    <p:sldId id="979" r:id="rId21"/>
+    <p:sldId id="1027" r:id="rId22"/>
   </p:sldIdLst>
   <p:sldSz cx="9144000" cy="5715000" type="screen16x10"/>
   <p:notesSz cx="6985000" cy="9283700"/>
@@ -1343,7 +1342,7 @@
             <a:fld id="{D37F8DB4-A4FF-4A8B-9A85-9B1874A58FCC}" type="slidenum">
               <a:rPr lang="en-US" smtClean="0"/>
               <a:pPr/>
-              <a:t>18</a:t>
+              <a:t>17</a:t>
             </a:fld>
             <a:endParaRPr lang="en-US"/>
           </a:p>
@@ -1687,7 +1686,7 @@
           <a:p>
             <a:r>
               <a:rPr lang="en-US" dirty="0"/>
-              <a:t>Which page seems like it should be the most important ?  H. </a:t>
+              <a:t>Which page seems like it should be the most important ?  H, since it has incoming edges (links)  from both E and F (total of 1 vote).  G and I both have one incoming edge, from either E or F (total of 0.5 vote each).</a:t>
             </a:r>
           </a:p>
           <a:p>
@@ -1784,10 +1783,53 @@
           <a:bodyPr/>
           <a:lstStyle/>
           <a:p>
+            <a:pPr marL="0" marR="0" lvl="0" indent="0" algn="l" defTabSz="914400" rtl="0" eaLnBrk="0" fontAlgn="base" latinLnBrk="0" hangingPunct="0">
+              <a:lnSpc>
+                <a:spcPct val="100000"/>
+              </a:lnSpc>
+              <a:spcBef>
+                <a:spcPct val="30000"/>
+              </a:spcBef>
+              <a:spcAft>
+                <a:spcPct val="0"/>
+              </a:spcAft>
+              <a:buClrTx/>
+              <a:buSzTx/>
+              <a:buFontTx/>
+              <a:buNone/>
+              <a:tabLst/>
+              <a:defRPr/>
+            </a:pPr>
             <a:r>
               <a:rPr lang="en-US" dirty="0"/>
-              <a:t>Now, F seems to be more important than E.  </a:t>
-            </a:r>
+              <a:t>Suppose A-D are also included, with edges as shown.  Now, F seems to be more important than E since it has three incoming edges, each with vote 1, whereas E only has one incoming edge with vote 1.</a:t>
+            </a:r>
+          </a:p>
+          <a:p>
+            <a:pPr marL="0" marR="0" lvl="0" indent="0" algn="l" defTabSz="914400" rtl="0" eaLnBrk="0" fontAlgn="base" latinLnBrk="0" hangingPunct="0">
+              <a:lnSpc>
+                <a:spcPct val="100000"/>
+              </a:lnSpc>
+              <a:spcBef>
+                <a:spcPct val="30000"/>
+              </a:spcBef>
+              <a:spcAft>
+                <a:spcPct val="0"/>
+              </a:spcAft>
+              <a:buClrTx/>
+              <a:buSzTx/>
+              <a:buFontTx/>
+              <a:buNone/>
+              <a:tabLst/>
+              <a:defRPr/>
+            </a:pPr>
+            <a:r>
+              <a:rPr lang="en-US" dirty="0"/>
+              <a:t>However, H still seems to be more important than G or I because E and F both point to it, while the others have either E or F.  So here the weight of E’s vote, as long as it’s nonzero, is less important than the fact that there are two votes for H.</a:t>
+            </a:r>
+          </a:p>
+          <a:p>
+            <a:endParaRPr lang="en-US" dirty="0"/>
           </a:p>
         </p:txBody>
       </p:sp>
@@ -1879,7 +1921,7 @@
           <a:p>
             <a:r>
               <a:rPr lang="en-US" dirty="0"/>
-              <a:t>H still seems to be more important than G or I because E and F both point to it, while the others have either E or F.  So here the weight of E’s vote, as long as it’s nonzero, is less important than the fact that there are two votes for H.</a:t>
+              <a:t>Consider another level out, the nodes pointing to A-D modeled here in green.  This would again modify the number of votes that A-D have to distribute to E and F, and thus to G-I.</a:t>
             </a:r>
           </a:p>
         </p:txBody>
@@ -1907,7 +1949,7 @@
               <a:pPr>
                 <a:defRPr/>
               </a:pPr>
-              <a:t>11</a:t>
+              <a:t>10</a:t>
             </a:fld>
             <a:endParaRPr lang="en-US"/>
           </a:p>
@@ -1916,7 +1958,7 @@
     </p:spTree>
     <p:extLst>
       <p:ext uri="{BB962C8B-B14F-4D97-AF65-F5344CB8AC3E}">
-        <p14:creationId xmlns:p14="http://schemas.microsoft.com/office/powerpoint/2010/main" val="3217112217"/>
+        <p14:creationId xmlns:p14="http://schemas.microsoft.com/office/powerpoint/2010/main" val="14672263"/>
       </p:ext>
     </p:extLst>
   </p:cSld>
@@ -1970,7 +2012,10 @@
           <a:bodyPr/>
           <a:lstStyle/>
           <a:p>
-            <a:endParaRPr lang="en-US" dirty="0"/>
+            <a:r>
+              <a:rPr lang="en-US" dirty="0"/>
+              <a:t>So in general, voting proceeds in rounds.  During each round, each page takes the number of votes received in the previous round to distribute equally to pages that it points to,</a:t>
+            </a:r>
           </a:p>
         </p:txBody>
       </p:sp>
@@ -1997,7 +2042,7 @@
               <a:pPr>
                 <a:defRPr/>
               </a:pPr>
-              <a:t>12</a:t>
+              <a:t>11</a:t>
             </a:fld>
             <a:endParaRPr lang="en-US"/>
           </a:p>
@@ -2006,7 +2051,7 @@
     </p:spTree>
     <p:extLst>
       <p:ext uri="{BB962C8B-B14F-4D97-AF65-F5344CB8AC3E}">
-        <p14:creationId xmlns:p14="http://schemas.microsoft.com/office/powerpoint/2010/main" val="14672263"/>
+        <p14:creationId xmlns:p14="http://schemas.microsoft.com/office/powerpoint/2010/main" val="1041219616"/>
       </p:ext>
     </p:extLst>
   </p:cSld>
@@ -2062,7 +2107,7 @@
           <a:p>
             <a:r>
               <a:rPr lang="en-US" dirty="0"/>
-              <a:t>PageRank formula.</a:t>
+              <a:t>In a given round of PageRank, we want to assign a rank to each page x, called PageRank(x) based on the ranks of all pages linking to it.  Each page gives an equal portion of its current rank (“vote”) to each page that it points to.  So if page j has Nj links out of it, then it gives PageRank(j)/Nj votes to each page that it links to.  So PageRank(x) is calculated by summing up, over all pages that link to x,  the “vote” of that page for x.</a:t>
             </a:r>
           </a:p>
         </p:txBody>
@@ -2090,7 +2135,7 @@
               <a:pPr>
                 <a:defRPr/>
               </a:pPr>
-              <a:t>13</a:t>
+              <a:t>12</a:t>
             </a:fld>
             <a:endParaRPr lang="en-US"/>
           </a:p>
@@ -2601,7 +2646,7 @@
             </a:pPr>
             <a:fld id="{3EC3B583-5CD6-D948-BDAB-85E48E211A61}" type="datetime1">
               <a:rPr lang="en-US" smtClean="0"/>
-              <a:t>11/27/2019</a:t>
+              <a:t>2/22/20</a:t>
             </a:fld>
             <a:endParaRPr lang="en-US" dirty="0"/>
           </a:p>
@@ -2942,7 +2987,7 @@
             </a:pPr>
             <a:fld id="{EDA10BB1-5FEF-5D49-A5E8-7A0C4CCDF4F5}" type="datetime1">
               <a:rPr lang="en-US" smtClean="0"/>
-              <a:t>11/27/2019</a:t>
+              <a:t>2/22/20</a:t>
             </a:fld>
             <a:endParaRPr lang="en-US" dirty="0"/>
           </a:p>
@@ -3583,7 +3628,7 @@
             </a:pPr>
             <a:fld id="{39870745-EE23-D54C-BC4E-FFEBC40C1B7F}" type="datetime1">
               <a:rPr lang="en-US" smtClean="0"/>
-              <a:t>11/27/2019</a:t>
+              <a:t>2/22/20</a:t>
             </a:fld>
             <a:endParaRPr lang="en-US"/>
           </a:p>
@@ -3924,7 +3969,7 @@
             </a:pPr>
             <a:fld id="{67213E9C-FF14-4643-83ED-B69CDAB453BF}" type="datetime1">
               <a:rPr lang="en-US" smtClean="0"/>
-              <a:t>11/27/2019</a:t>
+              <a:t>2/22/20</a:t>
             </a:fld>
             <a:endParaRPr lang="en-US" dirty="0"/>
           </a:p>
@@ -4552,7 +4597,7 @@
             </a:pPr>
             <a:fld id="{F9F9A853-1103-7247-9B77-965B90EE6D8E}" type="datetime1">
               <a:rPr lang="en-US" smtClean="0"/>
-              <a:t>11/27/2019</a:t>
+              <a:t>2/22/20</a:t>
             </a:fld>
             <a:endParaRPr lang="en-US"/>
           </a:p>
@@ -4937,7 +4982,7 @@
             </a:pPr>
             <a:fld id="{5F8EEEC3-67C0-2749-9296-FAA0346EEEE3}" type="datetime1">
               <a:rPr lang="en-US" smtClean="0"/>
-              <a:t>11/27/2019</a:t>
+              <a:t>2/22/20</a:t>
             </a:fld>
             <a:endParaRPr lang="en-US" dirty="0"/>
           </a:p>
@@ -5204,7 +5249,7 @@
             </a:pPr>
             <a:fld id="{B1CA23EC-4DEF-9149-8D08-AF5E17508753}" type="datetime1">
               <a:rPr lang="en-US" smtClean="0"/>
-              <a:t>11/27/2019</a:t>
+              <a:t>2/22/20</a:t>
             </a:fld>
             <a:endParaRPr lang="en-US" dirty="0"/>
           </a:p>
@@ -5477,7 +5522,7 @@
             </a:pPr>
             <a:fld id="{E2770287-97C7-0B4A-89AA-9C9EE7BEF919}" type="datetime1">
               <a:rPr lang="en-US" smtClean="0"/>
-              <a:t>11/27/2019</a:t>
+              <a:t>2/22/20</a:t>
             </a:fld>
             <a:endParaRPr lang="en-US" dirty="0"/>
           </a:p>
@@ -5786,7 +5831,7 @@
             </a:pPr>
             <a:fld id="{E551CE7D-B5D7-5745-8C89-C9AB849DC130}" type="datetime1">
               <a:rPr lang="en-US" smtClean="0"/>
-              <a:t>11/27/2019</a:t>
+              <a:t>2/22/20</a:t>
             </a:fld>
             <a:endParaRPr lang="en-US"/>
           </a:p>
@@ -6135,7 +6180,7 @@
             </a:pPr>
             <a:fld id="{8FBD591B-9D13-B949-9C7D-34F44F1D5FA5}" type="datetime1">
               <a:rPr lang="en-US" smtClean="0"/>
-              <a:t>11/27/2019</a:t>
+              <a:t>2/22/20</a:t>
             </a:fld>
             <a:endParaRPr lang="en-US" dirty="0"/>
           </a:p>
@@ -6530,7 +6575,7 @@
             </a:pPr>
             <a:fld id="{7698F29D-462E-7342-BA78-DA612F4BACDB}" type="datetime1">
               <a:rPr lang="en-US" smtClean="0"/>
-              <a:t>11/27/2019</a:t>
+              <a:t>2/22/20</a:t>
             </a:fld>
             <a:endParaRPr lang="en-US"/>
           </a:p>
@@ -7075,7 +7120,7 @@
             </a:pPr>
             <a:fld id="{A753903F-777F-8B4D-8568-B9E93A6194EB}" type="datetime1">
               <a:rPr lang="en-US" smtClean="0"/>
-              <a:t>11/27/2019</a:t>
+              <a:t>2/22/20</a:t>
             </a:fld>
             <a:endParaRPr lang="en-US" dirty="0"/>
           </a:p>
@@ -7286,7 +7331,7 @@
             </a:pPr>
             <a:fld id="{98721A9B-B6D4-3D45-A9ED-A90EF0C241CB}" type="datetime1">
               <a:rPr lang="en-US" smtClean="0"/>
-              <a:t>11/27/2019</a:t>
+              <a:t>2/22/20</a:t>
             </a:fld>
             <a:endParaRPr lang="en-US" dirty="0"/>
           </a:p>
@@ -7474,7 +7519,7 @@
             </a:pPr>
             <a:fld id="{D8FEF782-0C1E-1147-BDBC-60AA537F4082}" type="datetime1">
               <a:rPr lang="en-US" smtClean="0"/>
-              <a:t>11/27/2019</a:t>
+              <a:t>2/22/20</a:t>
             </a:fld>
             <a:endParaRPr lang="en-US"/>
           </a:p>
@@ -7850,7 +7895,7 @@
             </a:pPr>
             <a:fld id="{6AD18EFD-F73B-B24F-8869-B6F434543551}" type="datetime1">
               <a:rPr lang="en-US" smtClean="0"/>
-              <a:t>11/27/2019</a:t>
+              <a:t>2/22/20</a:t>
             </a:fld>
             <a:endParaRPr lang="en-US" dirty="0"/>
           </a:p>
@@ -8235,7 +8280,7 @@
             </a:pPr>
             <a:fld id="{F86D5DE9-9BBC-5948-BCD4-460FDA513281}" type="datetime1">
               <a:rPr lang="en-US" smtClean="0"/>
-              <a:t>11/27/2019</a:t>
+              <a:t>2/22/20</a:t>
             </a:fld>
             <a:endParaRPr lang="en-US" dirty="0"/>
           </a:p>
@@ -8601,7 +8646,7 @@
             </a:pPr>
             <a:fld id="{7323C85F-1269-B54F-84D5-B0E2FBC7E66E}" type="datetime1">
               <a:rPr lang="en-US" smtClean="0"/>
-              <a:t>11/27/2019</a:t>
+              <a:t>2/22/20</a:t>
             </a:fld>
             <a:endParaRPr lang="en-US"/>
           </a:p>
@@ -9415,908 +9460,6 @@
       </p:grpSpPr>
       <p:sp>
         <p:nvSpPr>
-          <p:cNvPr id="4" name="Footer Placeholder 3">
-            <a:extLst>
-              <a:ext uri="{FF2B5EF4-FFF2-40B4-BE49-F238E27FC236}">
-                <a16:creationId xmlns:a16="http://schemas.microsoft.com/office/drawing/2014/main" id="{523B8B3C-72D6-4434-9611-829EE7AD6C0F}"/>
-              </a:ext>
-            </a:extLst>
-          </p:cNvPr>
-          <p:cNvSpPr>
-            <a:spLocks noGrp="1"/>
-          </p:cNvSpPr>
-          <p:nvPr>
-            <p:ph type="ftr" sz="quarter" idx="11"/>
-          </p:nvPr>
-        </p:nvSpPr>
-        <p:spPr/>
-        <p:txBody>
-          <a:bodyPr/>
-          <a:lstStyle/>
-          <a:p>
-            <a:pPr>
-              <a:defRPr/>
-            </a:pPr>
-            <a:endParaRPr lang="en-GB"/>
-          </a:p>
-        </p:txBody>
-      </p:sp>
-      <p:sp>
-        <p:nvSpPr>
-          <p:cNvPr id="5" name="Slide Number Placeholder 4">
-            <a:extLst>
-              <a:ext uri="{FF2B5EF4-FFF2-40B4-BE49-F238E27FC236}">
-                <a16:creationId xmlns:a16="http://schemas.microsoft.com/office/drawing/2014/main" id="{AB3F6D96-0499-4935-91DB-4AFDEA2E81B3}"/>
-              </a:ext>
-            </a:extLst>
-          </p:cNvPr>
-          <p:cNvSpPr>
-            <a:spLocks noGrp="1"/>
-          </p:cNvSpPr>
-          <p:nvPr>
-            <p:ph type="sldNum" sz="quarter" idx="12"/>
-          </p:nvPr>
-        </p:nvSpPr>
-        <p:spPr/>
-        <p:txBody>
-          <a:bodyPr/>
-          <a:lstStyle/>
-          <a:p>
-            <a:pPr>
-              <a:defRPr/>
-            </a:pPr>
-            <a:fld id="{B5D931A1-A42B-F94C-ADA3-91D74B0ACBA8}" type="slidenum">
-              <a:rPr lang="en-GB" smtClean="0"/>
-              <a:pPr>
-                <a:defRPr/>
-              </a:pPr>
-              <a:t>10</a:t>
-            </a:fld>
-            <a:endParaRPr lang="en-GB"/>
-          </a:p>
-        </p:txBody>
-      </p:sp>
-      <p:sp>
-        <p:nvSpPr>
-          <p:cNvPr id="6" name="Oval 5">
-            <a:extLst>
-              <a:ext uri="{FF2B5EF4-FFF2-40B4-BE49-F238E27FC236}">
-                <a16:creationId xmlns:a16="http://schemas.microsoft.com/office/drawing/2014/main" id="{3C3C9FF5-0C55-4F15-AC95-4F7202336958}"/>
-              </a:ext>
-            </a:extLst>
-          </p:cNvPr>
-          <p:cNvSpPr/>
-          <p:nvPr/>
-        </p:nvSpPr>
-        <p:spPr>
-          <a:xfrm>
-            <a:off x="5084956" y="557561"/>
-            <a:ext cx="591015" cy="591015"/>
-          </a:xfrm>
-          <a:prstGeom prst="ellipse">
-            <a:avLst/>
-          </a:prstGeom>
-        </p:spPr>
-        <p:style>
-          <a:lnRef idx="2">
-            <a:schemeClr val="accent1">
-              <a:shade val="50000"/>
-            </a:schemeClr>
-          </a:lnRef>
-          <a:fillRef idx="1">
-            <a:schemeClr val="accent1"/>
-          </a:fillRef>
-          <a:effectRef idx="0">
-            <a:schemeClr val="accent1"/>
-          </a:effectRef>
-          <a:fontRef idx="minor">
-            <a:schemeClr val="lt1"/>
-          </a:fontRef>
-        </p:style>
-        <p:txBody>
-          <a:bodyPr rtlCol="0" anchor="ctr"/>
-          <a:lstStyle/>
-          <a:p>
-            <a:pPr algn="ctr"/>
-            <a:r>
-              <a:rPr lang="en-US" dirty="0"/>
-              <a:t>G</a:t>
-            </a:r>
-          </a:p>
-        </p:txBody>
-      </p:sp>
-      <p:sp>
-        <p:nvSpPr>
-          <p:cNvPr id="7" name="Oval 6">
-            <a:extLst>
-              <a:ext uri="{FF2B5EF4-FFF2-40B4-BE49-F238E27FC236}">
-                <a16:creationId xmlns:a16="http://schemas.microsoft.com/office/drawing/2014/main" id="{74C05A4B-CAD6-44F5-8208-7BD8289BFC35}"/>
-              </a:ext>
-            </a:extLst>
-          </p:cNvPr>
-          <p:cNvSpPr/>
-          <p:nvPr/>
-        </p:nvSpPr>
-        <p:spPr>
-          <a:xfrm>
-            <a:off x="5084956" y="1343722"/>
-            <a:ext cx="591015" cy="591015"/>
-          </a:xfrm>
-          <a:prstGeom prst="ellipse">
-            <a:avLst/>
-          </a:prstGeom>
-        </p:spPr>
-        <p:style>
-          <a:lnRef idx="2">
-            <a:schemeClr val="accent1">
-              <a:shade val="50000"/>
-            </a:schemeClr>
-          </a:lnRef>
-          <a:fillRef idx="1">
-            <a:schemeClr val="accent1"/>
-          </a:fillRef>
-          <a:effectRef idx="0">
-            <a:schemeClr val="accent1"/>
-          </a:effectRef>
-          <a:fontRef idx="minor">
-            <a:schemeClr val="lt1"/>
-          </a:fontRef>
-        </p:style>
-        <p:txBody>
-          <a:bodyPr rtlCol="0" anchor="ctr"/>
-          <a:lstStyle/>
-          <a:p>
-            <a:pPr algn="ctr"/>
-            <a:r>
-              <a:rPr lang="en-US" dirty="0"/>
-              <a:t>H</a:t>
-            </a:r>
-          </a:p>
-        </p:txBody>
-      </p:sp>
-      <p:sp>
-        <p:nvSpPr>
-          <p:cNvPr id="8" name="Oval 7">
-            <a:extLst>
-              <a:ext uri="{FF2B5EF4-FFF2-40B4-BE49-F238E27FC236}">
-                <a16:creationId xmlns:a16="http://schemas.microsoft.com/office/drawing/2014/main" id="{08DBF69F-FE62-4ACE-8214-32D8291468DC}"/>
-              </a:ext>
-            </a:extLst>
-          </p:cNvPr>
-          <p:cNvSpPr/>
-          <p:nvPr/>
-        </p:nvSpPr>
-        <p:spPr>
-          <a:xfrm>
-            <a:off x="5084956" y="2129882"/>
-            <a:ext cx="591015" cy="591015"/>
-          </a:xfrm>
-          <a:prstGeom prst="ellipse">
-            <a:avLst/>
-          </a:prstGeom>
-        </p:spPr>
-        <p:style>
-          <a:lnRef idx="2">
-            <a:schemeClr val="accent1">
-              <a:shade val="50000"/>
-            </a:schemeClr>
-          </a:lnRef>
-          <a:fillRef idx="1">
-            <a:schemeClr val="accent1"/>
-          </a:fillRef>
-          <a:effectRef idx="0">
-            <a:schemeClr val="accent1"/>
-          </a:effectRef>
-          <a:fontRef idx="minor">
-            <a:schemeClr val="lt1"/>
-          </a:fontRef>
-        </p:style>
-        <p:txBody>
-          <a:bodyPr rtlCol="0" anchor="ctr"/>
-          <a:lstStyle/>
-          <a:p>
-            <a:pPr algn="ctr"/>
-            <a:r>
-              <a:rPr lang="en-US" dirty="0"/>
-              <a:t>I</a:t>
-            </a:r>
-          </a:p>
-        </p:txBody>
-      </p:sp>
-      <p:sp>
-        <p:nvSpPr>
-          <p:cNvPr id="9" name="Oval 8">
-            <a:extLst>
-              <a:ext uri="{FF2B5EF4-FFF2-40B4-BE49-F238E27FC236}">
-                <a16:creationId xmlns:a16="http://schemas.microsoft.com/office/drawing/2014/main" id="{E915AF79-74F1-41FD-9732-6270455EA8B6}"/>
-              </a:ext>
-            </a:extLst>
-          </p:cNvPr>
-          <p:cNvSpPr/>
-          <p:nvPr/>
-        </p:nvSpPr>
-        <p:spPr>
-          <a:xfrm>
-            <a:off x="3919654" y="970156"/>
-            <a:ext cx="591015" cy="591015"/>
-          </a:xfrm>
-          <a:prstGeom prst="ellipse">
-            <a:avLst/>
-          </a:prstGeom>
-        </p:spPr>
-        <p:style>
-          <a:lnRef idx="2">
-            <a:schemeClr val="accent1">
-              <a:shade val="50000"/>
-            </a:schemeClr>
-          </a:lnRef>
-          <a:fillRef idx="1">
-            <a:schemeClr val="accent1"/>
-          </a:fillRef>
-          <a:effectRef idx="0">
-            <a:schemeClr val="accent1"/>
-          </a:effectRef>
-          <a:fontRef idx="minor">
-            <a:schemeClr val="lt1"/>
-          </a:fontRef>
-        </p:style>
-        <p:txBody>
-          <a:bodyPr rtlCol="0" anchor="ctr"/>
-          <a:lstStyle/>
-          <a:p>
-            <a:pPr algn="ctr"/>
-            <a:r>
-              <a:rPr lang="en-US" dirty="0"/>
-              <a:t>E</a:t>
-            </a:r>
-          </a:p>
-        </p:txBody>
-      </p:sp>
-      <p:sp>
-        <p:nvSpPr>
-          <p:cNvPr id="10" name="Oval 9">
-            <a:extLst>
-              <a:ext uri="{FF2B5EF4-FFF2-40B4-BE49-F238E27FC236}">
-                <a16:creationId xmlns:a16="http://schemas.microsoft.com/office/drawing/2014/main" id="{A74F6B96-1202-48B3-8A2F-D8A64BDD1859}"/>
-              </a:ext>
-            </a:extLst>
-          </p:cNvPr>
-          <p:cNvSpPr/>
-          <p:nvPr/>
-        </p:nvSpPr>
-        <p:spPr>
-          <a:xfrm>
-            <a:off x="3919654" y="1756316"/>
-            <a:ext cx="591015" cy="591015"/>
-          </a:xfrm>
-          <a:prstGeom prst="ellipse">
-            <a:avLst/>
-          </a:prstGeom>
-        </p:spPr>
-        <p:style>
-          <a:lnRef idx="2">
-            <a:schemeClr val="accent1">
-              <a:shade val="50000"/>
-            </a:schemeClr>
-          </a:lnRef>
-          <a:fillRef idx="1">
-            <a:schemeClr val="accent1"/>
-          </a:fillRef>
-          <a:effectRef idx="0">
-            <a:schemeClr val="accent1"/>
-          </a:effectRef>
-          <a:fontRef idx="minor">
-            <a:schemeClr val="lt1"/>
-          </a:fontRef>
-        </p:style>
-        <p:txBody>
-          <a:bodyPr rtlCol="0" anchor="ctr"/>
-          <a:lstStyle/>
-          <a:p>
-            <a:pPr algn="ctr"/>
-            <a:r>
-              <a:rPr lang="en-US" dirty="0"/>
-              <a:t>F</a:t>
-            </a:r>
-          </a:p>
-        </p:txBody>
-      </p:sp>
-      <p:sp>
-        <p:nvSpPr>
-          <p:cNvPr id="11" name="Oval 10">
-            <a:extLst>
-              <a:ext uri="{FF2B5EF4-FFF2-40B4-BE49-F238E27FC236}">
-                <a16:creationId xmlns:a16="http://schemas.microsoft.com/office/drawing/2014/main" id="{2BD32ED3-2C6C-49C6-92FC-674398F83669}"/>
-              </a:ext>
-            </a:extLst>
-          </p:cNvPr>
-          <p:cNvSpPr/>
-          <p:nvPr/>
-        </p:nvSpPr>
-        <p:spPr>
-          <a:xfrm>
-            <a:off x="2821259" y="165276"/>
-            <a:ext cx="591015" cy="591015"/>
-          </a:xfrm>
-          <a:prstGeom prst="ellipse">
-            <a:avLst/>
-          </a:prstGeom>
-        </p:spPr>
-        <p:style>
-          <a:lnRef idx="2">
-            <a:schemeClr val="accent1">
-              <a:shade val="50000"/>
-            </a:schemeClr>
-          </a:lnRef>
-          <a:fillRef idx="1">
-            <a:schemeClr val="accent1"/>
-          </a:fillRef>
-          <a:effectRef idx="0">
-            <a:schemeClr val="accent1"/>
-          </a:effectRef>
-          <a:fontRef idx="minor">
-            <a:schemeClr val="lt1"/>
-          </a:fontRef>
-        </p:style>
-        <p:txBody>
-          <a:bodyPr rtlCol="0" anchor="ctr"/>
-          <a:lstStyle/>
-          <a:p>
-            <a:pPr algn="ctr"/>
-            <a:r>
-              <a:rPr lang="en-US" dirty="0"/>
-              <a:t>A</a:t>
-            </a:r>
-          </a:p>
-        </p:txBody>
-      </p:sp>
-      <p:sp>
-        <p:nvSpPr>
-          <p:cNvPr id="12" name="Oval 11">
-            <a:extLst>
-              <a:ext uri="{FF2B5EF4-FFF2-40B4-BE49-F238E27FC236}">
-                <a16:creationId xmlns:a16="http://schemas.microsoft.com/office/drawing/2014/main" id="{FFD8A763-2B50-4D1C-AA50-9E3AB6043CA4}"/>
-              </a:ext>
-            </a:extLst>
-          </p:cNvPr>
-          <p:cNvSpPr/>
-          <p:nvPr/>
-        </p:nvSpPr>
-        <p:spPr>
-          <a:xfrm>
-            <a:off x="2821259" y="951437"/>
-            <a:ext cx="591015" cy="591015"/>
-          </a:xfrm>
-          <a:prstGeom prst="ellipse">
-            <a:avLst/>
-          </a:prstGeom>
-        </p:spPr>
-        <p:style>
-          <a:lnRef idx="2">
-            <a:schemeClr val="accent1">
-              <a:shade val="50000"/>
-            </a:schemeClr>
-          </a:lnRef>
-          <a:fillRef idx="1">
-            <a:schemeClr val="accent1"/>
-          </a:fillRef>
-          <a:effectRef idx="0">
-            <a:schemeClr val="accent1"/>
-          </a:effectRef>
-          <a:fontRef idx="minor">
-            <a:schemeClr val="lt1"/>
-          </a:fontRef>
-        </p:style>
-        <p:txBody>
-          <a:bodyPr rtlCol="0" anchor="ctr"/>
-          <a:lstStyle/>
-          <a:p>
-            <a:pPr algn="ctr"/>
-            <a:r>
-              <a:rPr lang="en-US" dirty="0"/>
-              <a:t>B</a:t>
-            </a:r>
-          </a:p>
-        </p:txBody>
-      </p:sp>
-      <p:sp>
-        <p:nvSpPr>
-          <p:cNvPr id="13" name="Oval 12">
-            <a:extLst>
-              <a:ext uri="{FF2B5EF4-FFF2-40B4-BE49-F238E27FC236}">
-                <a16:creationId xmlns:a16="http://schemas.microsoft.com/office/drawing/2014/main" id="{2BED3376-874F-4772-83B3-D61407FFB451}"/>
-              </a:ext>
-            </a:extLst>
-          </p:cNvPr>
-          <p:cNvSpPr/>
-          <p:nvPr/>
-        </p:nvSpPr>
-        <p:spPr>
-          <a:xfrm>
-            <a:off x="2821259" y="1737597"/>
-            <a:ext cx="591015" cy="591015"/>
-          </a:xfrm>
-          <a:prstGeom prst="ellipse">
-            <a:avLst/>
-          </a:prstGeom>
-        </p:spPr>
-        <p:style>
-          <a:lnRef idx="2">
-            <a:schemeClr val="accent1">
-              <a:shade val="50000"/>
-            </a:schemeClr>
-          </a:lnRef>
-          <a:fillRef idx="1">
-            <a:schemeClr val="accent1"/>
-          </a:fillRef>
-          <a:effectRef idx="0">
-            <a:schemeClr val="accent1"/>
-          </a:effectRef>
-          <a:fontRef idx="minor">
-            <a:schemeClr val="lt1"/>
-          </a:fontRef>
-        </p:style>
-        <p:txBody>
-          <a:bodyPr rtlCol="0" anchor="ctr"/>
-          <a:lstStyle/>
-          <a:p>
-            <a:pPr algn="ctr"/>
-            <a:r>
-              <a:rPr lang="en-US" dirty="0"/>
-              <a:t>C</a:t>
-            </a:r>
-          </a:p>
-        </p:txBody>
-      </p:sp>
-      <p:sp>
-        <p:nvSpPr>
-          <p:cNvPr id="14" name="Oval 13">
-            <a:extLst>
-              <a:ext uri="{FF2B5EF4-FFF2-40B4-BE49-F238E27FC236}">
-                <a16:creationId xmlns:a16="http://schemas.microsoft.com/office/drawing/2014/main" id="{342B10EA-D0A1-42CE-91D1-9E114F8CC77F}"/>
-              </a:ext>
-            </a:extLst>
-          </p:cNvPr>
-          <p:cNvSpPr/>
-          <p:nvPr/>
-        </p:nvSpPr>
-        <p:spPr>
-          <a:xfrm>
-            <a:off x="2821258" y="2523757"/>
-            <a:ext cx="591015" cy="591015"/>
-          </a:xfrm>
-          <a:prstGeom prst="ellipse">
-            <a:avLst/>
-          </a:prstGeom>
-        </p:spPr>
-        <p:style>
-          <a:lnRef idx="2">
-            <a:schemeClr val="accent1">
-              <a:shade val="50000"/>
-            </a:schemeClr>
-          </a:lnRef>
-          <a:fillRef idx="1">
-            <a:schemeClr val="accent1"/>
-          </a:fillRef>
-          <a:effectRef idx="0">
-            <a:schemeClr val="accent1"/>
-          </a:effectRef>
-          <a:fontRef idx="minor">
-            <a:schemeClr val="lt1"/>
-          </a:fontRef>
-        </p:style>
-        <p:txBody>
-          <a:bodyPr rtlCol="0" anchor="ctr"/>
-          <a:lstStyle/>
-          <a:p>
-            <a:pPr algn="ctr"/>
-            <a:r>
-              <a:rPr lang="en-US" dirty="0"/>
-              <a:t>D</a:t>
-            </a:r>
-          </a:p>
-        </p:txBody>
-      </p:sp>
-      <p:cxnSp>
-        <p:nvCxnSpPr>
-          <p:cNvPr id="16" name="Straight Arrow Connector 15">
-            <a:extLst>
-              <a:ext uri="{FF2B5EF4-FFF2-40B4-BE49-F238E27FC236}">
-                <a16:creationId xmlns:a16="http://schemas.microsoft.com/office/drawing/2014/main" id="{DA437A0A-2C9D-48FE-912E-745C88EA350E}"/>
-              </a:ext>
-            </a:extLst>
-          </p:cNvPr>
-          <p:cNvCxnSpPr>
-            <a:cxnSpLocks/>
-            <a:stCxn id="9" idx="7"/>
-            <a:endCxn id="6" idx="2"/>
-          </p:cNvCxnSpPr>
-          <p:nvPr/>
-        </p:nvCxnSpPr>
-        <p:spPr>
-          <a:xfrm flipV="1">
-            <a:off x="4424117" y="853069"/>
-            <a:ext cx="660839" cy="203639"/>
-          </a:xfrm>
-          <a:prstGeom prst="straightConnector1">
-            <a:avLst/>
-          </a:prstGeom>
-          <a:ln>
-            <a:solidFill>
-              <a:schemeClr val="tx2"/>
-            </a:solidFill>
-            <a:tailEnd type="triangle"/>
-          </a:ln>
-        </p:spPr>
-        <p:style>
-          <a:lnRef idx="1">
-            <a:schemeClr val="accent1"/>
-          </a:lnRef>
-          <a:fillRef idx="0">
-            <a:schemeClr val="accent1"/>
-          </a:fillRef>
-          <a:effectRef idx="0">
-            <a:schemeClr val="accent1"/>
-          </a:effectRef>
-          <a:fontRef idx="minor">
-            <a:schemeClr val="tx1"/>
-          </a:fontRef>
-        </p:style>
-      </p:cxnSp>
-      <p:cxnSp>
-        <p:nvCxnSpPr>
-          <p:cNvPr id="18" name="Straight Arrow Connector 17">
-            <a:extLst>
-              <a:ext uri="{FF2B5EF4-FFF2-40B4-BE49-F238E27FC236}">
-                <a16:creationId xmlns:a16="http://schemas.microsoft.com/office/drawing/2014/main" id="{1A64E8F9-9DA8-4A1C-9C0D-3F93222601FE}"/>
-              </a:ext>
-            </a:extLst>
-          </p:cNvPr>
-          <p:cNvCxnSpPr>
-            <a:cxnSpLocks/>
-            <a:stCxn id="9" idx="6"/>
-            <a:endCxn id="7" idx="1"/>
-          </p:cNvCxnSpPr>
-          <p:nvPr/>
-        </p:nvCxnSpPr>
-        <p:spPr>
-          <a:xfrm>
-            <a:off x="4510669" y="1265664"/>
-            <a:ext cx="660839" cy="164610"/>
-          </a:xfrm>
-          <a:prstGeom prst="straightConnector1">
-            <a:avLst/>
-          </a:prstGeom>
-          <a:ln>
-            <a:solidFill>
-              <a:schemeClr val="tx2"/>
-            </a:solidFill>
-            <a:tailEnd type="triangle"/>
-          </a:ln>
-        </p:spPr>
-        <p:style>
-          <a:lnRef idx="1">
-            <a:schemeClr val="accent1"/>
-          </a:lnRef>
-          <a:fillRef idx="0">
-            <a:schemeClr val="accent1"/>
-          </a:fillRef>
-          <a:effectRef idx="0">
-            <a:schemeClr val="accent1"/>
-          </a:effectRef>
-          <a:fontRef idx="minor">
-            <a:schemeClr val="tx1"/>
-          </a:fontRef>
-        </p:style>
-      </p:cxnSp>
-      <p:cxnSp>
-        <p:nvCxnSpPr>
-          <p:cNvPr id="21" name="Straight Arrow Connector 20">
-            <a:extLst>
-              <a:ext uri="{FF2B5EF4-FFF2-40B4-BE49-F238E27FC236}">
-                <a16:creationId xmlns:a16="http://schemas.microsoft.com/office/drawing/2014/main" id="{9D48F794-702C-4446-9E01-6B26EB9DAD64}"/>
-              </a:ext>
-            </a:extLst>
-          </p:cNvPr>
-          <p:cNvCxnSpPr>
-            <a:cxnSpLocks/>
-            <a:stCxn id="10" idx="5"/>
-            <a:endCxn id="8" idx="2"/>
-          </p:cNvCxnSpPr>
-          <p:nvPr/>
-        </p:nvCxnSpPr>
-        <p:spPr>
-          <a:xfrm>
-            <a:off x="4424117" y="2260779"/>
-            <a:ext cx="660839" cy="164611"/>
-          </a:xfrm>
-          <a:prstGeom prst="straightConnector1">
-            <a:avLst/>
-          </a:prstGeom>
-          <a:ln>
-            <a:solidFill>
-              <a:schemeClr val="tx2"/>
-            </a:solidFill>
-            <a:tailEnd type="triangle"/>
-          </a:ln>
-        </p:spPr>
-        <p:style>
-          <a:lnRef idx="1">
-            <a:schemeClr val="accent1"/>
-          </a:lnRef>
-          <a:fillRef idx="0">
-            <a:schemeClr val="accent1"/>
-          </a:fillRef>
-          <a:effectRef idx="0">
-            <a:schemeClr val="accent1"/>
-          </a:effectRef>
-          <a:fontRef idx="minor">
-            <a:schemeClr val="tx1"/>
-          </a:fontRef>
-        </p:style>
-      </p:cxnSp>
-      <p:cxnSp>
-        <p:nvCxnSpPr>
-          <p:cNvPr id="24" name="Straight Arrow Connector 23">
-            <a:extLst>
-              <a:ext uri="{FF2B5EF4-FFF2-40B4-BE49-F238E27FC236}">
-                <a16:creationId xmlns:a16="http://schemas.microsoft.com/office/drawing/2014/main" id="{2D80B4F8-51CD-488F-BFC7-A7E360F6A689}"/>
-              </a:ext>
-            </a:extLst>
-          </p:cNvPr>
-          <p:cNvCxnSpPr>
-            <a:cxnSpLocks/>
-            <a:stCxn id="10" idx="6"/>
-            <a:endCxn id="7" idx="3"/>
-          </p:cNvCxnSpPr>
-          <p:nvPr/>
-        </p:nvCxnSpPr>
-        <p:spPr>
-          <a:xfrm flipV="1">
-            <a:off x="4510669" y="1848185"/>
-            <a:ext cx="660839" cy="203639"/>
-          </a:xfrm>
-          <a:prstGeom prst="straightConnector1">
-            <a:avLst/>
-          </a:prstGeom>
-          <a:ln>
-            <a:solidFill>
-              <a:schemeClr val="tx2"/>
-            </a:solidFill>
-            <a:tailEnd type="triangle"/>
-          </a:ln>
-        </p:spPr>
-        <p:style>
-          <a:lnRef idx="1">
-            <a:schemeClr val="accent1"/>
-          </a:lnRef>
-          <a:fillRef idx="0">
-            <a:schemeClr val="accent1"/>
-          </a:fillRef>
-          <a:effectRef idx="0">
-            <a:schemeClr val="accent1"/>
-          </a:effectRef>
-          <a:fontRef idx="minor">
-            <a:schemeClr val="tx1"/>
-          </a:fontRef>
-        </p:style>
-      </p:cxnSp>
-      <p:cxnSp>
-        <p:nvCxnSpPr>
-          <p:cNvPr id="29" name="Straight Arrow Connector 28">
-            <a:extLst>
-              <a:ext uri="{FF2B5EF4-FFF2-40B4-BE49-F238E27FC236}">
-                <a16:creationId xmlns:a16="http://schemas.microsoft.com/office/drawing/2014/main" id="{F0FDE1A8-615D-4E12-AD07-730E2023B8D6}"/>
-              </a:ext>
-            </a:extLst>
-          </p:cNvPr>
-          <p:cNvCxnSpPr>
-            <a:cxnSpLocks/>
-            <a:stCxn id="13" idx="6"/>
-            <a:endCxn id="10" idx="2"/>
-          </p:cNvCxnSpPr>
-          <p:nvPr/>
-        </p:nvCxnSpPr>
-        <p:spPr>
-          <a:xfrm>
-            <a:off x="3412274" y="2033105"/>
-            <a:ext cx="507380" cy="18719"/>
-          </a:xfrm>
-          <a:prstGeom prst="straightConnector1">
-            <a:avLst/>
-          </a:prstGeom>
-          <a:ln>
-            <a:solidFill>
-              <a:schemeClr val="tx2"/>
-            </a:solidFill>
-            <a:tailEnd type="triangle"/>
-          </a:ln>
-        </p:spPr>
-        <p:style>
-          <a:lnRef idx="1">
-            <a:schemeClr val="accent1"/>
-          </a:lnRef>
-          <a:fillRef idx="0">
-            <a:schemeClr val="accent1"/>
-          </a:fillRef>
-          <a:effectRef idx="0">
-            <a:schemeClr val="accent1"/>
-          </a:effectRef>
-          <a:fontRef idx="minor">
-            <a:schemeClr val="tx1"/>
-          </a:fontRef>
-        </p:style>
-      </p:cxnSp>
-      <p:cxnSp>
-        <p:nvCxnSpPr>
-          <p:cNvPr id="32" name="Straight Arrow Connector 31">
-            <a:extLst>
-              <a:ext uri="{FF2B5EF4-FFF2-40B4-BE49-F238E27FC236}">
-                <a16:creationId xmlns:a16="http://schemas.microsoft.com/office/drawing/2014/main" id="{C5285E7F-D8B0-4BBC-8418-3615BFD586E5}"/>
-              </a:ext>
-            </a:extLst>
-          </p:cNvPr>
-          <p:cNvCxnSpPr>
-            <a:cxnSpLocks/>
-            <a:stCxn id="14" idx="7"/>
-            <a:endCxn id="10" idx="3"/>
-          </p:cNvCxnSpPr>
-          <p:nvPr/>
-        </p:nvCxnSpPr>
-        <p:spPr>
-          <a:xfrm flipV="1">
-            <a:off x="3325721" y="2260779"/>
-            <a:ext cx="680485" cy="349530"/>
-          </a:xfrm>
-          <a:prstGeom prst="straightConnector1">
-            <a:avLst/>
-          </a:prstGeom>
-          <a:ln>
-            <a:solidFill>
-              <a:schemeClr val="tx2"/>
-            </a:solidFill>
-            <a:tailEnd type="triangle"/>
-          </a:ln>
-        </p:spPr>
-        <p:style>
-          <a:lnRef idx="1">
-            <a:schemeClr val="accent1"/>
-          </a:lnRef>
-          <a:fillRef idx="0">
-            <a:schemeClr val="accent1"/>
-          </a:fillRef>
-          <a:effectRef idx="0">
-            <a:schemeClr val="accent1"/>
-          </a:effectRef>
-          <a:fontRef idx="minor">
-            <a:schemeClr val="tx1"/>
-          </a:fontRef>
-        </p:style>
-      </p:cxnSp>
-      <p:cxnSp>
-        <p:nvCxnSpPr>
-          <p:cNvPr id="35" name="Straight Arrow Connector 34">
-            <a:extLst>
-              <a:ext uri="{FF2B5EF4-FFF2-40B4-BE49-F238E27FC236}">
-                <a16:creationId xmlns:a16="http://schemas.microsoft.com/office/drawing/2014/main" id="{6FE5EED8-93EF-4538-B71D-4B1F39D29B28}"/>
-              </a:ext>
-            </a:extLst>
-          </p:cNvPr>
-          <p:cNvCxnSpPr>
-            <a:cxnSpLocks/>
-            <a:stCxn id="11" idx="6"/>
-            <a:endCxn id="9" idx="1"/>
-          </p:cNvCxnSpPr>
-          <p:nvPr/>
-        </p:nvCxnSpPr>
-        <p:spPr>
-          <a:xfrm>
-            <a:off x="3412274" y="460784"/>
-            <a:ext cx="593932" cy="595924"/>
-          </a:xfrm>
-          <a:prstGeom prst="straightConnector1">
-            <a:avLst/>
-          </a:prstGeom>
-          <a:ln>
-            <a:solidFill>
-              <a:schemeClr val="tx2"/>
-            </a:solidFill>
-            <a:tailEnd type="triangle"/>
-          </a:ln>
-        </p:spPr>
-        <p:style>
-          <a:lnRef idx="1">
-            <a:schemeClr val="accent1"/>
-          </a:lnRef>
-          <a:fillRef idx="0">
-            <a:schemeClr val="accent1"/>
-          </a:fillRef>
-          <a:effectRef idx="0">
-            <a:schemeClr val="accent1"/>
-          </a:effectRef>
-          <a:fontRef idx="minor">
-            <a:schemeClr val="tx1"/>
-          </a:fontRef>
-        </p:style>
-      </p:cxnSp>
-      <p:cxnSp>
-        <p:nvCxnSpPr>
-          <p:cNvPr id="36" name="Straight Arrow Connector 35">
-            <a:extLst>
-              <a:ext uri="{FF2B5EF4-FFF2-40B4-BE49-F238E27FC236}">
-                <a16:creationId xmlns:a16="http://schemas.microsoft.com/office/drawing/2014/main" id="{005D9D0D-FF73-41ED-944F-3A8B73235267}"/>
-              </a:ext>
-            </a:extLst>
-          </p:cNvPr>
-          <p:cNvCxnSpPr>
-            <a:cxnSpLocks/>
-            <a:stCxn id="12" idx="5"/>
-            <a:endCxn id="10" idx="1"/>
-          </p:cNvCxnSpPr>
-          <p:nvPr/>
-        </p:nvCxnSpPr>
-        <p:spPr>
-          <a:xfrm>
-            <a:off x="3325722" y="1455900"/>
-            <a:ext cx="680484" cy="386968"/>
-          </a:xfrm>
-          <a:prstGeom prst="straightConnector1">
-            <a:avLst/>
-          </a:prstGeom>
-          <a:ln>
-            <a:solidFill>
-              <a:schemeClr val="tx2"/>
-            </a:solidFill>
-            <a:tailEnd type="triangle"/>
-          </a:ln>
-        </p:spPr>
-        <p:style>
-          <a:lnRef idx="1">
-            <a:schemeClr val="accent1"/>
-          </a:lnRef>
-          <a:fillRef idx="0">
-            <a:schemeClr val="accent1"/>
-          </a:fillRef>
-          <a:effectRef idx="0">
-            <a:schemeClr val="accent1"/>
-          </a:effectRef>
-          <a:fontRef idx="minor">
-            <a:schemeClr val="tx1"/>
-          </a:fontRef>
-        </p:style>
-      </p:cxnSp>
-    </p:spTree>
-    <p:extLst>
-      <p:ext uri="{BB962C8B-B14F-4D97-AF65-F5344CB8AC3E}">
-        <p14:creationId xmlns:p14="http://schemas.microsoft.com/office/powerpoint/2010/main" val="1090832767"/>
-      </p:ext>
-    </p:extLst>
-  </p:cSld>
-  <p:clrMapOvr>
-    <a:masterClrMapping/>
-  </p:clrMapOvr>
-</p:sld>
-</file>
-
-<file path=ppt/slides/slide11.xml><?xml version="1.0" encoding="utf-8"?>
-<p:sld xmlns:a="http://schemas.openxmlformats.org/drawingml/2006/main" xmlns:r="http://schemas.openxmlformats.org/officeDocument/2006/relationships" xmlns:p="http://schemas.openxmlformats.org/presentationml/2006/main">
-  <p:cSld>
-    <p:spTree>
-      <p:nvGrpSpPr>
-        <p:cNvPr id="1" name=""/>
-        <p:cNvGrpSpPr/>
-        <p:nvPr/>
-      </p:nvGrpSpPr>
-      <p:grpSpPr>
-        <a:xfrm>
-          <a:off x="0" y="0"/>
-          <a:ext cx="0" cy="0"/>
-          <a:chOff x="0" y="0"/>
-          <a:chExt cx="0" cy="0"/>
-        </a:xfrm>
-      </p:grpSpPr>
-      <p:sp>
-        <p:nvSpPr>
           <p:cNvPr id="2" name="Title 1"/>
           <p:cNvSpPr>
             <a:spLocks noGrp="1"/>
@@ -10355,7 +9498,7 @@
             <a:fld id="{103F590D-1EE3-4679-BAB2-47D8C4772F51}" type="slidenum">
               <a:rPr lang="en-GB" smtClean="0"/>
               <a:pPr/>
-              <a:t>11</a:t>
+              <a:t>10</a:t>
             </a:fld>
             <a:endParaRPr lang="en-GB"/>
           </a:p>
@@ -11472,10 +10615,960 @@
           </a:p>
         </p:txBody>
       </p:sp>
+      <p:sp>
+        <p:nvSpPr>
+          <p:cNvPr id="22" name="Oval 21">
+            <a:extLst>
+              <a:ext uri="{FF2B5EF4-FFF2-40B4-BE49-F238E27FC236}">
+                <a16:creationId xmlns:a16="http://schemas.microsoft.com/office/drawing/2014/main" id="{AB72FDE2-F3E3-464C-9B1B-89C9CC1A6C10}"/>
+              </a:ext>
+            </a:extLst>
+          </p:cNvPr>
+          <p:cNvSpPr/>
+          <p:nvPr/>
+        </p:nvSpPr>
+        <p:spPr bwMode="auto">
+          <a:xfrm>
+            <a:off x="2388128" y="2129127"/>
+            <a:ext cx="179024" cy="179024"/>
+          </a:xfrm>
+          <a:prstGeom prst="ellipse">
+            <a:avLst/>
+          </a:prstGeom>
+          <a:solidFill>
+            <a:srgbClr val="33CC33"/>
+          </a:solidFill>
+          <a:ln w="19050" cap="flat" cmpd="sng" algn="ctr">
+            <a:solidFill>
+              <a:schemeClr val="tx1"/>
+            </a:solidFill>
+            <a:prstDash val="solid"/>
+            <a:round/>
+            <a:headEnd type="none" w="med" len="med"/>
+            <a:tailEnd type="none" w="med" len="med"/>
+          </a:ln>
+          <a:effectLst/>
+        </p:spPr>
+        <p:txBody>
+          <a:bodyPr rtlCol="0" anchor="ctr"/>
+          <a:lstStyle/>
+          <a:p>
+            <a:pPr algn="ctr"/>
+            <a:endParaRPr lang="en-US" sz="1500"/>
+          </a:p>
+        </p:txBody>
+      </p:sp>
+      <p:sp>
+        <p:nvSpPr>
+          <p:cNvPr id="23" name="Oval 22">
+            <a:extLst>
+              <a:ext uri="{FF2B5EF4-FFF2-40B4-BE49-F238E27FC236}">
+                <a16:creationId xmlns:a16="http://schemas.microsoft.com/office/drawing/2014/main" id="{CD486B98-F2C9-4641-A7E6-E6487EBB797E}"/>
+              </a:ext>
+            </a:extLst>
+          </p:cNvPr>
+          <p:cNvSpPr/>
+          <p:nvPr/>
+        </p:nvSpPr>
+        <p:spPr bwMode="auto">
+          <a:xfrm>
+            <a:off x="2337174" y="2350841"/>
+            <a:ext cx="179024" cy="179024"/>
+          </a:xfrm>
+          <a:prstGeom prst="ellipse">
+            <a:avLst/>
+          </a:prstGeom>
+          <a:solidFill>
+            <a:srgbClr val="33CC33"/>
+          </a:solidFill>
+          <a:ln w="19050" cap="flat" cmpd="sng" algn="ctr">
+            <a:solidFill>
+              <a:schemeClr val="tx1"/>
+            </a:solidFill>
+            <a:prstDash val="solid"/>
+            <a:round/>
+            <a:headEnd type="none" w="med" len="med"/>
+            <a:tailEnd type="none" w="med" len="med"/>
+          </a:ln>
+          <a:effectLst/>
+        </p:spPr>
+        <p:txBody>
+          <a:bodyPr rtlCol="0" anchor="ctr"/>
+          <a:lstStyle/>
+          <a:p>
+            <a:pPr algn="ctr"/>
+            <a:endParaRPr lang="en-US" sz="1500"/>
+          </a:p>
+        </p:txBody>
+      </p:sp>
+      <p:sp>
+        <p:nvSpPr>
+          <p:cNvPr id="24" name="Oval 23">
+            <a:extLst>
+              <a:ext uri="{FF2B5EF4-FFF2-40B4-BE49-F238E27FC236}">
+                <a16:creationId xmlns:a16="http://schemas.microsoft.com/office/drawing/2014/main" id="{553E0AA2-C45B-419A-AD92-D2405E57C799}"/>
+              </a:ext>
+            </a:extLst>
+          </p:cNvPr>
+          <p:cNvSpPr/>
+          <p:nvPr/>
+        </p:nvSpPr>
+        <p:spPr bwMode="auto">
+          <a:xfrm>
+            <a:off x="2401898" y="2564293"/>
+            <a:ext cx="179024" cy="179024"/>
+          </a:xfrm>
+          <a:prstGeom prst="ellipse">
+            <a:avLst/>
+          </a:prstGeom>
+          <a:solidFill>
+            <a:srgbClr val="33CC33"/>
+          </a:solidFill>
+          <a:ln w="19050" cap="flat" cmpd="sng" algn="ctr">
+            <a:solidFill>
+              <a:schemeClr val="tx1"/>
+            </a:solidFill>
+            <a:prstDash val="solid"/>
+            <a:round/>
+            <a:headEnd type="none" w="med" len="med"/>
+            <a:tailEnd type="none" w="med" len="med"/>
+          </a:ln>
+          <a:effectLst/>
+        </p:spPr>
+        <p:txBody>
+          <a:bodyPr rtlCol="0" anchor="ctr"/>
+          <a:lstStyle/>
+          <a:p>
+            <a:pPr algn="ctr"/>
+            <a:endParaRPr lang="en-US" sz="1500"/>
+          </a:p>
+        </p:txBody>
+      </p:sp>
+      <p:sp>
+        <p:nvSpPr>
+          <p:cNvPr id="25" name="Oval 24">
+            <a:extLst>
+              <a:ext uri="{FF2B5EF4-FFF2-40B4-BE49-F238E27FC236}">
+                <a16:creationId xmlns:a16="http://schemas.microsoft.com/office/drawing/2014/main" id="{19B3E667-B26D-4D0C-9B40-7827C8C55429}"/>
+              </a:ext>
+            </a:extLst>
+          </p:cNvPr>
+          <p:cNvSpPr/>
+          <p:nvPr/>
+        </p:nvSpPr>
+        <p:spPr bwMode="auto">
+          <a:xfrm>
+            <a:off x="2491208" y="2758128"/>
+            <a:ext cx="179024" cy="179024"/>
+          </a:xfrm>
+          <a:prstGeom prst="ellipse">
+            <a:avLst/>
+          </a:prstGeom>
+          <a:solidFill>
+            <a:srgbClr val="33CC33"/>
+          </a:solidFill>
+          <a:ln w="19050" cap="flat" cmpd="sng" algn="ctr">
+            <a:solidFill>
+              <a:schemeClr val="tx1"/>
+            </a:solidFill>
+            <a:prstDash val="solid"/>
+            <a:round/>
+            <a:headEnd type="none" w="med" len="med"/>
+            <a:tailEnd type="none" w="med" len="med"/>
+          </a:ln>
+          <a:effectLst/>
+        </p:spPr>
+        <p:txBody>
+          <a:bodyPr rtlCol="0" anchor="ctr"/>
+          <a:lstStyle/>
+          <a:p>
+            <a:pPr algn="ctr"/>
+            <a:endParaRPr lang="en-US" sz="1500"/>
+          </a:p>
+        </p:txBody>
+      </p:sp>
+      <p:sp>
+        <p:nvSpPr>
+          <p:cNvPr id="44" name="Oval 43">
+            <a:extLst>
+              <a:ext uri="{FF2B5EF4-FFF2-40B4-BE49-F238E27FC236}">
+                <a16:creationId xmlns:a16="http://schemas.microsoft.com/office/drawing/2014/main" id="{997E782B-9AF5-4917-BD9F-44B7F0275AF8}"/>
+              </a:ext>
+            </a:extLst>
+          </p:cNvPr>
+          <p:cNvSpPr/>
+          <p:nvPr/>
+        </p:nvSpPr>
+        <p:spPr bwMode="auto">
+          <a:xfrm>
+            <a:off x="2613974" y="2024467"/>
+            <a:ext cx="179024" cy="179024"/>
+          </a:xfrm>
+          <a:prstGeom prst="ellipse">
+            <a:avLst/>
+          </a:prstGeom>
+          <a:solidFill>
+            <a:srgbClr val="33CC33"/>
+          </a:solidFill>
+          <a:ln w="19050" cap="flat" cmpd="sng" algn="ctr">
+            <a:solidFill>
+              <a:schemeClr val="tx1"/>
+            </a:solidFill>
+            <a:prstDash val="solid"/>
+            <a:round/>
+            <a:headEnd type="none" w="med" len="med"/>
+            <a:tailEnd type="none" w="med" len="med"/>
+          </a:ln>
+          <a:effectLst/>
+        </p:spPr>
+        <p:txBody>
+          <a:bodyPr rtlCol="0" anchor="ctr"/>
+          <a:lstStyle/>
+          <a:p>
+            <a:pPr algn="ctr"/>
+            <a:endParaRPr lang="en-US" sz="1500"/>
+          </a:p>
+        </p:txBody>
+      </p:sp>
+      <p:sp>
+        <p:nvSpPr>
+          <p:cNvPr id="45" name="Oval 44">
+            <a:extLst>
+              <a:ext uri="{FF2B5EF4-FFF2-40B4-BE49-F238E27FC236}">
+                <a16:creationId xmlns:a16="http://schemas.microsoft.com/office/drawing/2014/main" id="{E1A8AFCF-27F4-4D99-A2CD-0DE02E337DCE}"/>
+              </a:ext>
+            </a:extLst>
+          </p:cNvPr>
+          <p:cNvSpPr/>
+          <p:nvPr/>
+        </p:nvSpPr>
+        <p:spPr bwMode="auto">
+          <a:xfrm>
+            <a:off x="2753061" y="2774991"/>
+            <a:ext cx="179024" cy="179024"/>
+          </a:xfrm>
+          <a:prstGeom prst="ellipse">
+            <a:avLst/>
+          </a:prstGeom>
+          <a:solidFill>
+            <a:srgbClr val="33CC33"/>
+          </a:solidFill>
+          <a:ln w="19050" cap="flat" cmpd="sng" algn="ctr">
+            <a:solidFill>
+              <a:schemeClr val="tx1"/>
+            </a:solidFill>
+            <a:prstDash val="solid"/>
+            <a:round/>
+            <a:headEnd type="none" w="med" len="med"/>
+            <a:tailEnd type="none" w="med" len="med"/>
+          </a:ln>
+          <a:effectLst/>
+        </p:spPr>
+        <p:txBody>
+          <a:bodyPr rtlCol="0" anchor="ctr"/>
+          <a:lstStyle/>
+          <a:p>
+            <a:pPr algn="ctr"/>
+            <a:endParaRPr lang="en-US" sz="1500"/>
+          </a:p>
+        </p:txBody>
+      </p:sp>
+      <p:sp>
+        <p:nvSpPr>
+          <p:cNvPr id="46" name="Oval 45">
+            <a:extLst>
+              <a:ext uri="{FF2B5EF4-FFF2-40B4-BE49-F238E27FC236}">
+                <a16:creationId xmlns:a16="http://schemas.microsoft.com/office/drawing/2014/main" id="{8C7CCA67-77FD-4DAA-9B7B-A64096A34321}"/>
+              </a:ext>
+            </a:extLst>
+          </p:cNvPr>
+          <p:cNvSpPr/>
+          <p:nvPr/>
+        </p:nvSpPr>
+        <p:spPr bwMode="auto">
+          <a:xfrm>
+            <a:off x="2792998" y="1221218"/>
+            <a:ext cx="179024" cy="179024"/>
+          </a:xfrm>
+          <a:prstGeom prst="ellipse">
+            <a:avLst/>
+          </a:prstGeom>
+          <a:solidFill>
+            <a:srgbClr val="33CC33"/>
+          </a:solidFill>
+          <a:ln w="19050" cap="flat" cmpd="sng" algn="ctr">
+            <a:solidFill>
+              <a:schemeClr val="tx1"/>
+            </a:solidFill>
+            <a:prstDash val="solid"/>
+            <a:round/>
+            <a:headEnd type="none" w="med" len="med"/>
+            <a:tailEnd type="none" w="med" len="med"/>
+          </a:ln>
+          <a:effectLst/>
+        </p:spPr>
+        <p:txBody>
+          <a:bodyPr rtlCol="0" anchor="ctr"/>
+          <a:lstStyle/>
+          <a:p>
+            <a:pPr algn="ctr"/>
+            <a:endParaRPr lang="en-US" sz="1500"/>
+          </a:p>
+        </p:txBody>
+      </p:sp>
+      <p:sp>
+        <p:nvSpPr>
+          <p:cNvPr id="47" name="Oval 46">
+            <a:extLst>
+              <a:ext uri="{FF2B5EF4-FFF2-40B4-BE49-F238E27FC236}">
+                <a16:creationId xmlns:a16="http://schemas.microsoft.com/office/drawing/2014/main" id="{BD919BA0-6973-4319-8B31-35CC75CDD656}"/>
+              </a:ext>
+            </a:extLst>
+          </p:cNvPr>
+          <p:cNvSpPr/>
+          <p:nvPr/>
+        </p:nvSpPr>
+        <p:spPr bwMode="auto">
+          <a:xfrm>
+            <a:off x="2827426" y="1700845"/>
+            <a:ext cx="179024" cy="179024"/>
+          </a:xfrm>
+          <a:prstGeom prst="ellipse">
+            <a:avLst/>
+          </a:prstGeom>
+          <a:solidFill>
+            <a:srgbClr val="33CC33"/>
+          </a:solidFill>
+          <a:ln w="19050" cap="flat" cmpd="sng" algn="ctr">
+            <a:solidFill>
+              <a:schemeClr val="tx1"/>
+            </a:solidFill>
+            <a:prstDash val="solid"/>
+            <a:round/>
+            <a:headEnd type="none" w="med" len="med"/>
+            <a:tailEnd type="none" w="med" len="med"/>
+          </a:ln>
+          <a:effectLst/>
+        </p:spPr>
+        <p:txBody>
+          <a:bodyPr rtlCol="0" anchor="ctr"/>
+          <a:lstStyle/>
+          <a:p>
+            <a:pPr algn="ctr"/>
+            <a:endParaRPr lang="en-US" sz="1500"/>
+          </a:p>
+        </p:txBody>
+      </p:sp>
+      <p:cxnSp>
+        <p:nvCxnSpPr>
+          <p:cNvPr id="48" name="Straight Arrow Connector 47">
+            <a:extLst>
+              <a:ext uri="{FF2B5EF4-FFF2-40B4-BE49-F238E27FC236}">
+                <a16:creationId xmlns:a16="http://schemas.microsoft.com/office/drawing/2014/main" id="{F608CA99-0866-4118-9987-0E30E732627B}"/>
+              </a:ext>
+            </a:extLst>
+          </p:cNvPr>
+          <p:cNvCxnSpPr>
+            <a:cxnSpLocks/>
+            <a:stCxn id="46" idx="6"/>
+            <a:endCxn id="31" idx="2"/>
+          </p:cNvCxnSpPr>
+          <p:nvPr/>
+        </p:nvCxnSpPr>
+        <p:spPr bwMode="auto">
+          <a:xfrm flipV="1">
+            <a:off x="2972022" y="1269247"/>
+            <a:ext cx="367769" cy="41483"/>
+          </a:xfrm>
+          <a:prstGeom prst="straightConnector1">
+            <a:avLst/>
+          </a:prstGeom>
+          <a:solidFill>
+            <a:schemeClr val="accent1"/>
+          </a:solidFill>
+          <a:ln w="19050" cap="flat" cmpd="sng" algn="ctr">
+            <a:solidFill>
+              <a:schemeClr val="tx1"/>
+            </a:solidFill>
+            <a:prstDash val="solid"/>
+            <a:round/>
+            <a:headEnd type="none" w="med" len="med"/>
+            <a:tailEnd type="arrow"/>
+          </a:ln>
+          <a:effectLst/>
+        </p:spPr>
+      </p:cxnSp>
+      <p:cxnSp>
+        <p:nvCxnSpPr>
+          <p:cNvPr id="49" name="Straight Arrow Connector 48">
+            <a:extLst>
+              <a:ext uri="{FF2B5EF4-FFF2-40B4-BE49-F238E27FC236}">
+                <a16:creationId xmlns:a16="http://schemas.microsoft.com/office/drawing/2014/main" id="{05E2F38B-EDB8-48B0-8F12-ADE658E41DDF}"/>
+              </a:ext>
+            </a:extLst>
+          </p:cNvPr>
+          <p:cNvCxnSpPr>
+            <a:cxnSpLocks/>
+            <a:stCxn id="47" idx="6"/>
+            <a:endCxn id="32" idx="2"/>
+          </p:cNvCxnSpPr>
+          <p:nvPr/>
+        </p:nvCxnSpPr>
+        <p:spPr bwMode="auto">
+          <a:xfrm>
+            <a:off x="3006450" y="1790357"/>
+            <a:ext cx="333340" cy="129110"/>
+          </a:xfrm>
+          <a:prstGeom prst="straightConnector1">
+            <a:avLst/>
+          </a:prstGeom>
+          <a:solidFill>
+            <a:schemeClr val="accent1"/>
+          </a:solidFill>
+          <a:ln w="19050" cap="flat" cmpd="sng" algn="ctr">
+            <a:solidFill>
+              <a:schemeClr val="tx1"/>
+            </a:solidFill>
+            <a:prstDash val="solid"/>
+            <a:round/>
+            <a:headEnd type="none" w="med" len="med"/>
+            <a:tailEnd type="arrow"/>
+          </a:ln>
+          <a:effectLst/>
+        </p:spPr>
+      </p:cxnSp>
+      <p:cxnSp>
+        <p:nvCxnSpPr>
+          <p:cNvPr id="50" name="Straight Arrow Connector 49">
+            <a:extLst>
+              <a:ext uri="{FF2B5EF4-FFF2-40B4-BE49-F238E27FC236}">
+                <a16:creationId xmlns:a16="http://schemas.microsoft.com/office/drawing/2014/main" id="{2EA4AD23-8AAF-4555-B445-61181066D762}"/>
+              </a:ext>
+            </a:extLst>
+          </p:cNvPr>
+          <p:cNvCxnSpPr>
+            <a:cxnSpLocks/>
+            <a:stCxn id="58" idx="5"/>
+            <a:endCxn id="33" idx="2"/>
+          </p:cNvCxnSpPr>
+          <p:nvPr/>
+        </p:nvCxnSpPr>
+        <p:spPr bwMode="auto">
+          <a:xfrm>
+            <a:off x="3017414" y="2303967"/>
+            <a:ext cx="322375" cy="274623"/>
+          </a:xfrm>
+          <a:prstGeom prst="straightConnector1">
+            <a:avLst/>
+          </a:prstGeom>
+          <a:solidFill>
+            <a:schemeClr val="accent1"/>
+          </a:solidFill>
+          <a:ln w="19050" cap="flat" cmpd="sng" algn="ctr">
+            <a:solidFill>
+              <a:schemeClr val="tx1"/>
+            </a:solidFill>
+            <a:prstDash val="solid"/>
+            <a:round/>
+            <a:headEnd type="none" w="med" len="med"/>
+            <a:tailEnd type="arrow"/>
+          </a:ln>
+          <a:effectLst/>
+        </p:spPr>
+      </p:cxnSp>
+      <p:cxnSp>
+        <p:nvCxnSpPr>
+          <p:cNvPr id="51" name="Straight Arrow Connector 50">
+            <a:extLst>
+              <a:ext uri="{FF2B5EF4-FFF2-40B4-BE49-F238E27FC236}">
+                <a16:creationId xmlns:a16="http://schemas.microsoft.com/office/drawing/2014/main" id="{A8477494-FDAD-40A2-B3A7-2B45743FA57C}"/>
+              </a:ext>
+            </a:extLst>
+          </p:cNvPr>
+          <p:cNvCxnSpPr>
+            <a:stCxn id="22" idx="6"/>
+          </p:cNvCxnSpPr>
+          <p:nvPr/>
+        </p:nvCxnSpPr>
+        <p:spPr bwMode="auto">
+          <a:xfrm>
+            <a:off x="2567152" y="2218639"/>
+            <a:ext cx="793214" cy="399359"/>
+          </a:xfrm>
+          <a:prstGeom prst="straightConnector1">
+            <a:avLst/>
+          </a:prstGeom>
+          <a:solidFill>
+            <a:schemeClr val="accent1"/>
+          </a:solidFill>
+          <a:ln w="19050" cap="flat" cmpd="sng" algn="ctr">
+            <a:solidFill>
+              <a:schemeClr val="tx1"/>
+            </a:solidFill>
+            <a:prstDash val="solid"/>
+            <a:round/>
+            <a:headEnd type="none" w="med" len="med"/>
+            <a:tailEnd type="arrow"/>
+          </a:ln>
+          <a:effectLst/>
+        </p:spPr>
+      </p:cxnSp>
+      <p:cxnSp>
+        <p:nvCxnSpPr>
+          <p:cNvPr id="52" name="Straight Arrow Connector 51">
+            <a:extLst>
+              <a:ext uri="{FF2B5EF4-FFF2-40B4-BE49-F238E27FC236}">
+                <a16:creationId xmlns:a16="http://schemas.microsoft.com/office/drawing/2014/main" id="{79A12975-340C-4729-99F5-DBEF443DFFEC}"/>
+              </a:ext>
+            </a:extLst>
+          </p:cNvPr>
+          <p:cNvCxnSpPr>
+            <a:cxnSpLocks/>
+            <a:stCxn id="45" idx="6"/>
+            <a:endCxn id="33" idx="3"/>
+          </p:cNvCxnSpPr>
+          <p:nvPr/>
+        </p:nvCxnSpPr>
+        <p:spPr bwMode="auto">
+          <a:xfrm flipV="1">
+            <a:off x="2932085" y="2787545"/>
+            <a:ext cx="494256" cy="76958"/>
+          </a:xfrm>
+          <a:prstGeom prst="straightConnector1">
+            <a:avLst/>
+          </a:prstGeom>
+          <a:solidFill>
+            <a:schemeClr val="accent1"/>
+          </a:solidFill>
+          <a:ln w="19050" cap="flat" cmpd="sng" algn="ctr">
+            <a:solidFill>
+              <a:schemeClr val="tx1"/>
+            </a:solidFill>
+            <a:prstDash val="solid"/>
+            <a:round/>
+            <a:headEnd type="none" w="med" len="med"/>
+            <a:tailEnd type="arrow"/>
+          </a:ln>
+          <a:effectLst/>
+        </p:spPr>
+      </p:cxnSp>
+      <p:cxnSp>
+        <p:nvCxnSpPr>
+          <p:cNvPr id="53" name="Straight Arrow Connector 52">
+            <a:extLst>
+              <a:ext uri="{FF2B5EF4-FFF2-40B4-BE49-F238E27FC236}">
+                <a16:creationId xmlns:a16="http://schemas.microsoft.com/office/drawing/2014/main" id="{C401AB40-933D-4B6B-BA94-84120A417ACC}"/>
+              </a:ext>
+            </a:extLst>
+          </p:cNvPr>
+          <p:cNvCxnSpPr>
+            <a:stCxn id="61" idx="6"/>
+          </p:cNvCxnSpPr>
+          <p:nvPr/>
+        </p:nvCxnSpPr>
+        <p:spPr bwMode="auto">
+          <a:xfrm>
+            <a:off x="2830180" y="2597342"/>
+            <a:ext cx="530186" cy="20655"/>
+          </a:xfrm>
+          <a:prstGeom prst="straightConnector1">
+            <a:avLst/>
+          </a:prstGeom>
+          <a:solidFill>
+            <a:schemeClr val="accent1"/>
+          </a:solidFill>
+          <a:ln w="19050" cap="flat" cmpd="sng" algn="ctr">
+            <a:solidFill>
+              <a:schemeClr val="tx1"/>
+            </a:solidFill>
+            <a:prstDash val="solid"/>
+            <a:round/>
+            <a:headEnd type="none" w="med" len="med"/>
+            <a:tailEnd type="arrow"/>
+          </a:ln>
+          <a:effectLst/>
+        </p:spPr>
+      </p:cxnSp>
+      <p:cxnSp>
+        <p:nvCxnSpPr>
+          <p:cNvPr id="54" name="Straight Arrow Connector 53">
+            <a:extLst>
+              <a:ext uri="{FF2B5EF4-FFF2-40B4-BE49-F238E27FC236}">
+                <a16:creationId xmlns:a16="http://schemas.microsoft.com/office/drawing/2014/main" id="{9D0B25F0-5310-4F56-B180-56830BED8484}"/>
+              </a:ext>
+            </a:extLst>
+          </p:cNvPr>
+          <p:cNvCxnSpPr>
+            <a:stCxn id="25" idx="7"/>
+          </p:cNvCxnSpPr>
+          <p:nvPr/>
+        </p:nvCxnSpPr>
+        <p:spPr bwMode="auto">
+          <a:xfrm rot="5400000" flipH="1" flipV="1">
+            <a:off x="2973141" y="2369079"/>
+            <a:ext cx="86139" cy="744395"/>
+          </a:xfrm>
+          <a:prstGeom prst="straightConnector1">
+            <a:avLst/>
+          </a:prstGeom>
+          <a:solidFill>
+            <a:schemeClr val="accent1"/>
+          </a:solidFill>
+          <a:ln w="19050" cap="flat" cmpd="sng" algn="ctr">
+            <a:solidFill>
+              <a:schemeClr val="tx1"/>
+            </a:solidFill>
+            <a:prstDash val="solid"/>
+            <a:round/>
+            <a:headEnd type="none" w="med" len="med"/>
+            <a:tailEnd type="arrow"/>
+          </a:ln>
+          <a:effectLst/>
+        </p:spPr>
+      </p:cxnSp>
+      <p:cxnSp>
+        <p:nvCxnSpPr>
+          <p:cNvPr id="55" name="Straight Arrow Connector 54">
+            <a:extLst>
+              <a:ext uri="{FF2B5EF4-FFF2-40B4-BE49-F238E27FC236}">
+                <a16:creationId xmlns:a16="http://schemas.microsoft.com/office/drawing/2014/main" id="{D86E306E-D513-411D-956C-AE9E0D7A8D19}"/>
+              </a:ext>
+            </a:extLst>
+          </p:cNvPr>
+          <p:cNvCxnSpPr>
+            <a:stCxn id="23" idx="6"/>
+          </p:cNvCxnSpPr>
+          <p:nvPr/>
+        </p:nvCxnSpPr>
+        <p:spPr bwMode="auto">
+          <a:xfrm>
+            <a:off x="2516198" y="2440352"/>
+            <a:ext cx="844168" cy="177645"/>
+          </a:xfrm>
+          <a:prstGeom prst="straightConnector1">
+            <a:avLst/>
+          </a:prstGeom>
+          <a:solidFill>
+            <a:schemeClr val="accent1"/>
+          </a:solidFill>
+          <a:ln w="19050" cap="flat" cmpd="sng" algn="ctr">
+            <a:solidFill>
+              <a:schemeClr val="tx1"/>
+            </a:solidFill>
+            <a:prstDash val="solid"/>
+            <a:round/>
+            <a:headEnd type="none" w="med" len="med"/>
+            <a:tailEnd type="arrow"/>
+          </a:ln>
+          <a:effectLst/>
+        </p:spPr>
+      </p:cxnSp>
+      <p:cxnSp>
+        <p:nvCxnSpPr>
+          <p:cNvPr id="56" name="Straight Arrow Connector 55">
+            <a:extLst>
+              <a:ext uri="{FF2B5EF4-FFF2-40B4-BE49-F238E27FC236}">
+                <a16:creationId xmlns:a16="http://schemas.microsoft.com/office/drawing/2014/main" id="{D30CF11B-32C2-4796-A9A8-0D52CE700C3D}"/>
+              </a:ext>
+            </a:extLst>
+          </p:cNvPr>
+          <p:cNvCxnSpPr>
+            <a:cxnSpLocks/>
+            <a:stCxn id="44" idx="5"/>
+            <a:endCxn id="33" idx="1"/>
+          </p:cNvCxnSpPr>
+          <p:nvPr/>
+        </p:nvCxnSpPr>
+        <p:spPr bwMode="auto">
+          <a:xfrm>
+            <a:off x="2766781" y="2177274"/>
+            <a:ext cx="659560" cy="192360"/>
+          </a:xfrm>
+          <a:prstGeom prst="straightConnector1">
+            <a:avLst/>
+          </a:prstGeom>
+          <a:solidFill>
+            <a:schemeClr val="accent1"/>
+          </a:solidFill>
+          <a:ln w="19050" cap="flat" cmpd="sng" algn="ctr">
+            <a:solidFill>
+              <a:schemeClr val="tx1"/>
+            </a:solidFill>
+            <a:prstDash val="solid"/>
+            <a:round/>
+            <a:headEnd type="none" w="med" len="med"/>
+            <a:tailEnd type="arrow"/>
+          </a:ln>
+          <a:effectLst/>
+        </p:spPr>
+      </p:cxnSp>
+      <p:sp>
+        <p:nvSpPr>
+          <p:cNvPr id="57" name="Oval 56">
+            <a:extLst>
+              <a:ext uri="{FF2B5EF4-FFF2-40B4-BE49-F238E27FC236}">
+                <a16:creationId xmlns:a16="http://schemas.microsoft.com/office/drawing/2014/main" id="{09053D79-89A6-4045-9FBC-1255F0D4D134}"/>
+              </a:ext>
+            </a:extLst>
+          </p:cNvPr>
+          <p:cNvSpPr/>
+          <p:nvPr/>
+        </p:nvSpPr>
+        <p:spPr bwMode="auto">
+          <a:xfrm>
+            <a:off x="2652533" y="2277854"/>
+            <a:ext cx="179024" cy="179024"/>
+          </a:xfrm>
+          <a:prstGeom prst="ellipse">
+            <a:avLst/>
+          </a:prstGeom>
+          <a:solidFill>
+            <a:srgbClr val="33CC33"/>
+          </a:solidFill>
+          <a:ln w="19050" cap="flat" cmpd="sng" algn="ctr">
+            <a:solidFill>
+              <a:schemeClr val="tx1"/>
+            </a:solidFill>
+            <a:prstDash val="solid"/>
+            <a:round/>
+            <a:headEnd type="none" w="med" len="med"/>
+            <a:tailEnd type="none" w="med" len="med"/>
+          </a:ln>
+          <a:effectLst/>
+        </p:spPr>
+        <p:txBody>
+          <a:bodyPr rtlCol="0" anchor="ctr"/>
+          <a:lstStyle/>
+          <a:p>
+            <a:pPr algn="ctr"/>
+            <a:endParaRPr lang="en-US" sz="1500"/>
+          </a:p>
+        </p:txBody>
+      </p:sp>
+      <p:sp>
+        <p:nvSpPr>
+          <p:cNvPr id="58" name="Oval 57">
+            <a:extLst>
+              <a:ext uri="{FF2B5EF4-FFF2-40B4-BE49-F238E27FC236}">
+                <a16:creationId xmlns:a16="http://schemas.microsoft.com/office/drawing/2014/main" id="{269520B0-D49F-47C6-8942-7BA39E7A6A7B}"/>
+              </a:ext>
+            </a:extLst>
+          </p:cNvPr>
+          <p:cNvSpPr/>
+          <p:nvPr/>
+        </p:nvSpPr>
+        <p:spPr bwMode="auto">
+          <a:xfrm>
+            <a:off x="2864607" y="2151160"/>
+            <a:ext cx="179024" cy="179024"/>
+          </a:xfrm>
+          <a:prstGeom prst="ellipse">
+            <a:avLst/>
+          </a:prstGeom>
+          <a:solidFill>
+            <a:srgbClr val="33CC33"/>
+          </a:solidFill>
+          <a:ln w="19050" cap="flat" cmpd="sng" algn="ctr">
+            <a:solidFill>
+              <a:schemeClr val="tx1"/>
+            </a:solidFill>
+            <a:prstDash val="solid"/>
+            <a:round/>
+            <a:headEnd type="none" w="med" len="med"/>
+            <a:tailEnd type="none" w="med" len="med"/>
+          </a:ln>
+          <a:effectLst/>
+        </p:spPr>
+        <p:txBody>
+          <a:bodyPr rtlCol="0" anchor="ctr"/>
+          <a:lstStyle/>
+          <a:p>
+            <a:pPr algn="ctr"/>
+            <a:endParaRPr lang="en-US" sz="1500"/>
+          </a:p>
+        </p:txBody>
+      </p:sp>
+      <p:sp>
+        <p:nvSpPr>
+          <p:cNvPr id="59" name="Oval 58">
+            <a:extLst>
+              <a:ext uri="{FF2B5EF4-FFF2-40B4-BE49-F238E27FC236}">
+                <a16:creationId xmlns:a16="http://schemas.microsoft.com/office/drawing/2014/main" id="{6001FB68-9DB5-49B3-AA16-C0A2239C56DB}"/>
+              </a:ext>
+            </a:extLst>
+          </p:cNvPr>
+          <p:cNvSpPr/>
+          <p:nvPr/>
+        </p:nvSpPr>
+        <p:spPr bwMode="auto">
+          <a:xfrm>
+            <a:off x="2904544" y="2438976"/>
+            <a:ext cx="179024" cy="179024"/>
+          </a:xfrm>
+          <a:prstGeom prst="ellipse">
+            <a:avLst/>
+          </a:prstGeom>
+          <a:solidFill>
+            <a:srgbClr val="33CC33"/>
+          </a:solidFill>
+          <a:ln w="19050" cap="flat" cmpd="sng" algn="ctr">
+            <a:solidFill>
+              <a:schemeClr val="tx1"/>
+            </a:solidFill>
+            <a:prstDash val="solid"/>
+            <a:round/>
+            <a:headEnd type="none" w="med" len="med"/>
+            <a:tailEnd type="none" w="med" len="med"/>
+          </a:ln>
+          <a:effectLst/>
+        </p:spPr>
+        <p:txBody>
+          <a:bodyPr rtlCol="0" anchor="ctr"/>
+          <a:lstStyle/>
+          <a:p>
+            <a:pPr algn="ctr"/>
+            <a:endParaRPr lang="en-US" sz="1500"/>
+          </a:p>
+        </p:txBody>
+      </p:sp>
+      <p:cxnSp>
+        <p:nvCxnSpPr>
+          <p:cNvPr id="60" name="Straight Arrow Connector 59">
+            <a:extLst>
+              <a:ext uri="{FF2B5EF4-FFF2-40B4-BE49-F238E27FC236}">
+                <a16:creationId xmlns:a16="http://schemas.microsoft.com/office/drawing/2014/main" id="{CB90705F-75E9-4784-ABB3-CC3EF8132118}"/>
+              </a:ext>
+            </a:extLst>
+          </p:cNvPr>
+          <p:cNvCxnSpPr>
+            <a:stCxn id="24" idx="6"/>
+          </p:cNvCxnSpPr>
+          <p:nvPr/>
+        </p:nvCxnSpPr>
+        <p:spPr bwMode="auto">
+          <a:xfrm flipV="1">
+            <a:off x="2580921" y="2617999"/>
+            <a:ext cx="779444" cy="35807"/>
+          </a:xfrm>
+          <a:prstGeom prst="straightConnector1">
+            <a:avLst/>
+          </a:prstGeom>
+          <a:solidFill>
+            <a:schemeClr val="accent1"/>
+          </a:solidFill>
+          <a:ln w="19050" cap="flat" cmpd="sng" algn="ctr">
+            <a:solidFill>
+              <a:schemeClr val="tx1"/>
+            </a:solidFill>
+            <a:prstDash val="solid"/>
+            <a:round/>
+            <a:headEnd type="none" w="med" len="med"/>
+            <a:tailEnd type="arrow"/>
+          </a:ln>
+          <a:effectLst/>
+        </p:spPr>
+      </p:cxnSp>
+      <p:sp>
+        <p:nvSpPr>
+          <p:cNvPr id="61" name="Oval 60">
+            <a:extLst>
+              <a:ext uri="{FF2B5EF4-FFF2-40B4-BE49-F238E27FC236}">
+                <a16:creationId xmlns:a16="http://schemas.microsoft.com/office/drawing/2014/main" id="{3EE341D0-370C-4114-BE9F-0AA7FDC0AA52}"/>
+              </a:ext>
+            </a:extLst>
+          </p:cNvPr>
+          <p:cNvSpPr/>
+          <p:nvPr/>
+        </p:nvSpPr>
+        <p:spPr bwMode="auto">
+          <a:xfrm>
+            <a:off x="2651156" y="2507831"/>
+            <a:ext cx="179024" cy="179024"/>
+          </a:xfrm>
+          <a:prstGeom prst="ellipse">
+            <a:avLst/>
+          </a:prstGeom>
+          <a:solidFill>
+            <a:srgbClr val="33CC33"/>
+          </a:solidFill>
+          <a:ln w="19050" cap="flat" cmpd="sng" algn="ctr">
+            <a:solidFill>
+              <a:schemeClr val="tx1"/>
+            </a:solidFill>
+            <a:prstDash val="solid"/>
+            <a:round/>
+            <a:headEnd type="none" w="med" len="med"/>
+            <a:tailEnd type="none" w="med" len="med"/>
+          </a:ln>
+          <a:effectLst/>
+        </p:spPr>
+        <p:txBody>
+          <a:bodyPr rtlCol="0" anchor="ctr"/>
+          <a:lstStyle/>
+          <a:p>
+            <a:pPr algn="ctr"/>
+            <a:endParaRPr lang="en-US" sz="1500"/>
+          </a:p>
+        </p:txBody>
+      </p:sp>
+      <p:sp>
+        <p:nvSpPr>
+          <p:cNvPr id="62" name="TextBox 61">
+            <a:extLst>
+              <a:ext uri="{FF2B5EF4-FFF2-40B4-BE49-F238E27FC236}">
+                <a16:creationId xmlns:a16="http://schemas.microsoft.com/office/drawing/2014/main" id="{CC73F9C4-D0BA-45F7-8290-EC212C1E318D}"/>
+              </a:ext>
+            </a:extLst>
+          </p:cNvPr>
+          <p:cNvSpPr txBox="1"/>
+          <p:nvPr/>
+        </p:nvSpPr>
+        <p:spPr>
+          <a:xfrm>
+            <a:off x="609255" y="1424338"/>
+            <a:ext cx="2015295" cy="584775"/>
+          </a:xfrm>
+          <a:prstGeom prst="rect">
+            <a:avLst/>
+          </a:prstGeom>
+          <a:noFill/>
+        </p:spPr>
+        <p:txBody>
+          <a:bodyPr wrap="none" rtlCol="0">
+            <a:spAutoFit/>
+          </a:bodyPr>
+          <a:lstStyle/>
+          <a:p>
+            <a:r>
+              <a:rPr lang="en-US" sz="1600" dirty="0">
+                <a:solidFill>
+                  <a:schemeClr val="tx2"/>
+                </a:solidFill>
+              </a:rPr>
+              <a:t>How many levels</a:t>
+            </a:r>
+            <a:br>
+              <a:rPr lang="en-US" sz="1600" dirty="0">
+                <a:solidFill>
+                  <a:schemeClr val="tx2"/>
+                </a:solidFill>
+              </a:rPr>
+            </a:br>
+            <a:r>
+              <a:rPr lang="en-US" sz="1600" dirty="0">
+                <a:solidFill>
+                  <a:schemeClr val="tx2"/>
+                </a:solidFill>
+              </a:rPr>
+              <a:t>should we consider?</a:t>
+            </a:r>
+          </a:p>
+        </p:txBody>
+      </p:sp>
     </p:spTree>
     <p:extLst>
       <p:ext uri="{BB962C8B-B14F-4D97-AF65-F5344CB8AC3E}">
-        <p14:creationId xmlns:p14="http://schemas.microsoft.com/office/powerpoint/2010/main" val="776631455"/>
+        <p14:creationId xmlns:p14="http://schemas.microsoft.com/office/powerpoint/2010/main" val="3906568139"/>
       </p:ext>
     </p:extLst>
   </p:cSld>
@@ -11485,7 +11578,7 @@
 </p:sld>
 </file>
 
-<file path=ppt/slides/slide12.xml><?xml version="1.0" encoding="utf-8"?>
+<file path=ppt/slides/slide11.xml><?xml version="1.0" encoding="utf-8"?>
 <p:sld xmlns:a="http://schemas.openxmlformats.org/drawingml/2006/main" xmlns:r="http://schemas.openxmlformats.org/officeDocument/2006/relationships" xmlns:p="http://schemas.openxmlformats.org/presentationml/2006/main">
   <p:cSld>
     <p:spTree>
@@ -11542,7 +11635,7 @@
             <a:fld id="{103F590D-1EE3-4679-BAB2-47D8C4772F51}" type="slidenum">
               <a:rPr lang="en-GB" smtClean="0"/>
               <a:pPr/>
-              <a:t>12</a:t>
+              <a:t>11</a:t>
             </a:fld>
             <a:endParaRPr lang="en-GB"/>
           </a:p>
@@ -13684,95 +13777,17 @@
     </p:spTree>
     <p:extLst>
       <p:ext uri="{BB962C8B-B14F-4D97-AF65-F5344CB8AC3E}">
-        <p14:creationId xmlns:p14="http://schemas.microsoft.com/office/powerpoint/2010/main" val="3906568139"/>
+        <p14:creationId xmlns:p14="http://schemas.microsoft.com/office/powerpoint/2010/main" val="2743431785"/>
       </p:ext>
     </p:extLst>
   </p:cSld>
   <p:clrMapOvr>
     <a:masterClrMapping/>
   </p:clrMapOvr>
-  <p:timing>
-    <p:tnLst>
-      <p:par>
-        <p:cTn id="1" dur="indefinite" restart="never" nodeType="tmRoot">
-          <p:childTnLst>
-            <p:seq concurrent="1" nextAc="seek">
-              <p:cTn id="2" dur="indefinite" nodeType="mainSeq">
-                <p:childTnLst>
-                  <p:par>
-                    <p:cTn id="3" fill="hold">
-                      <p:stCondLst>
-                        <p:cond delay="indefinite"/>
-                      </p:stCondLst>
-                      <p:childTnLst>
-                        <p:par>
-                          <p:cTn id="4" fill="hold">
-                            <p:stCondLst>
-                              <p:cond delay="0"/>
-                            </p:stCondLst>
-                            <p:childTnLst>
-                              <p:par>
-                                <p:cTn id="5" presetID="1" presetClass="entr" presetSubtype="0" fill="hold" grpId="0" nodeType="clickEffect">
-                                  <p:stCondLst>
-                                    <p:cond delay="0"/>
-                                  </p:stCondLst>
-                                  <p:childTnLst>
-                                    <p:set>
-                                      <p:cBhvr>
-                                        <p:cTn id="6" dur="1" fill="hold">
-                                          <p:stCondLst>
-                                            <p:cond delay="0"/>
-                                          </p:stCondLst>
-                                        </p:cTn>
-                                        <p:tgtEl>
-                                          <p:spTgt spid="13"/>
-                                        </p:tgtEl>
-                                        <p:attrNameLst>
-                                          <p:attrName>style.visibility</p:attrName>
-                                        </p:attrNameLst>
-                                      </p:cBhvr>
-                                      <p:to>
-                                        <p:strVal val="visible"/>
-                                      </p:to>
-                                    </p:set>
-                                  </p:childTnLst>
-                                </p:cTn>
-                              </p:par>
-                            </p:childTnLst>
-                          </p:cTn>
-                        </p:par>
-                      </p:childTnLst>
-                    </p:cTn>
-                  </p:par>
-                </p:childTnLst>
-              </p:cTn>
-              <p:prevCondLst>
-                <p:cond evt="onPrev" delay="0">
-                  <p:tgtEl>
-                    <p:sldTgt/>
-                  </p:tgtEl>
-                </p:cond>
-              </p:prevCondLst>
-              <p:nextCondLst>
-                <p:cond evt="onNext" delay="0">
-                  <p:tgtEl>
-                    <p:sldTgt/>
-                  </p:tgtEl>
-                </p:cond>
-              </p:nextCondLst>
-            </p:seq>
-          </p:childTnLst>
-        </p:cTn>
-      </p:par>
-    </p:tnLst>
-    <p:bldLst>
-      <p:bldP spid="13" grpId="0" animBg="1"/>
-    </p:bldLst>
-  </p:timing>
 </p:sld>
 </file>
 
-<file path=ppt/slides/slide13.xml><?xml version="1.0" encoding="utf-8"?>
+<file path=ppt/slides/slide12.xml><?xml version="1.0" encoding="utf-8"?>
 <p:sld xmlns:a="http://schemas.openxmlformats.org/drawingml/2006/main" xmlns:r="http://schemas.openxmlformats.org/officeDocument/2006/relationships" xmlns:p="http://schemas.openxmlformats.org/presentationml/2006/main">
   <p:cSld>
     <p:spTree>
@@ -13934,7 +13949,7 @@
             <a:fld id="{103F590D-1EE3-4679-BAB2-47D8C4772F51}" type="slidenum">
               <a:rPr lang="en-GB" smtClean="0"/>
               <a:pPr/>
-              <a:t>13</a:t>
+              <a:t>12</a:t>
             </a:fld>
             <a:endParaRPr lang="en-GB"/>
           </a:p>
@@ -15002,6 +15017,101 @@
 </p:sld>
 </file>
 
+<file path=ppt/slides/slide13.xml><?xml version="1.0" encoding="utf-8"?>
+<p:sld xmlns:a="http://schemas.openxmlformats.org/drawingml/2006/main" xmlns:r="http://schemas.openxmlformats.org/officeDocument/2006/relationships" xmlns:p="http://schemas.openxmlformats.org/presentationml/2006/main">
+  <p:cSld>
+    <p:spTree>
+      <p:nvGrpSpPr>
+        <p:cNvPr id="1" name=""/>
+        <p:cNvGrpSpPr/>
+        <p:nvPr/>
+      </p:nvGrpSpPr>
+      <p:grpSpPr>
+        <a:xfrm>
+          <a:off x="0" y="0"/>
+          <a:ext cx="0" cy="0"/>
+          <a:chOff x="0" y="0"/>
+          <a:chExt cx="0" cy="0"/>
+        </a:xfrm>
+      </p:grpSpPr>
+      <p:sp>
+        <p:nvSpPr>
+          <p:cNvPr id="6" name="Title 5"/>
+          <p:cNvSpPr>
+            <a:spLocks noGrp="1"/>
+          </p:cNvSpPr>
+          <p:nvPr>
+            <p:ph type="title"/>
+          </p:nvPr>
+        </p:nvSpPr>
+        <p:spPr/>
+        <p:txBody>
+          <a:bodyPr/>
+          <a:lstStyle/>
+          <a:p>
+            <a:r>
+              <a:rPr lang="en-US" dirty="0"/>
+              <a:t>Implementing Naïve PageRank</a:t>
+            </a:r>
+          </a:p>
+        </p:txBody>
+      </p:sp>
+      <p:sp>
+        <p:nvSpPr>
+          <p:cNvPr id="7" name="Text Placeholder 6"/>
+          <p:cNvSpPr>
+            <a:spLocks noGrp="1"/>
+          </p:cNvSpPr>
+          <p:nvPr>
+            <p:ph type="body" idx="1"/>
+          </p:nvPr>
+        </p:nvSpPr>
+        <p:spPr/>
+        <p:txBody>
+          <a:bodyPr/>
+          <a:lstStyle/>
+          <a:p>
+            <a:endParaRPr lang="en-US"/>
+          </a:p>
+        </p:txBody>
+      </p:sp>
+      <p:sp>
+        <p:nvSpPr>
+          <p:cNvPr id="5" name="Slide Number Placeholder 4"/>
+          <p:cNvSpPr>
+            <a:spLocks noGrp="1"/>
+          </p:cNvSpPr>
+          <p:nvPr>
+            <p:ph type="sldNum" sz="quarter" idx="12"/>
+          </p:nvPr>
+        </p:nvSpPr>
+        <p:spPr/>
+        <p:txBody>
+          <a:bodyPr/>
+          <a:lstStyle/>
+          <a:p>
+            <a:fld id="{05072F42-4DFA-4725-86F9-7594E4AB4EB5}" type="slidenum">
+              <a:rPr lang="en-GB" smtClean="0"/>
+              <a:pPr/>
+              <a:t>13</a:t>
+            </a:fld>
+            <a:endParaRPr lang="en-GB"/>
+          </a:p>
+        </p:txBody>
+      </p:sp>
+    </p:spTree>
+    <p:extLst>
+      <p:ext uri="{BB962C8B-B14F-4D97-AF65-F5344CB8AC3E}">
+        <p14:creationId xmlns:p14="http://schemas.microsoft.com/office/powerpoint/2010/main" val="1062543493"/>
+      </p:ext>
+    </p:extLst>
+  </p:cSld>
+  <p:clrMapOvr>
+    <a:masterClrMapping/>
+  </p:clrMapOvr>
+</p:sld>
+</file>
+
 <file path=ppt/slides/slide14.xml><?xml version="1.0" encoding="utf-8"?>
 <p:sld xmlns:a="http://schemas.openxmlformats.org/drawingml/2006/main" xmlns:r="http://schemas.openxmlformats.org/officeDocument/2006/relationships" xmlns:p="http://schemas.openxmlformats.org/presentationml/2006/main">
   <p:cSld>
@@ -15036,27 +15146,48 @@
           <a:p>
             <a:r>
               <a:rPr lang="en-US" dirty="0"/>
-              <a:t>Implementing Naïve PageRank</a:t>
-            </a:r>
-          </a:p>
-        </p:txBody>
-      </p:sp>
-      <p:sp>
-        <p:nvSpPr>
-          <p:cNvPr id="7" name="Text Placeholder 6"/>
+              <a:t>Restating the Simplified Model</a:t>
+            </a:r>
+            <a:br>
+              <a:rPr lang="en-US" dirty="0"/>
+            </a:br>
+            <a:r>
+              <a:rPr lang="en-US" dirty="0"/>
+              <a:t>as a Browsing Experience</a:t>
+            </a:r>
+          </a:p>
+        </p:txBody>
+      </p:sp>
+      <p:sp>
+        <p:nvSpPr>
+          <p:cNvPr id="7" name="Content Placeholder 6"/>
           <p:cNvSpPr>
             <a:spLocks noGrp="1"/>
           </p:cNvSpPr>
           <p:nvPr>
-            <p:ph type="body" idx="1"/>
+            <p:ph idx="1"/>
           </p:nvPr>
         </p:nvSpPr>
-        <p:spPr/>
+        <p:spPr>
+          <a:xfrm>
+            <a:off x="983292" y="553452"/>
+            <a:ext cx="7204969" cy="3703099"/>
+          </a:xfrm>
+        </p:spPr>
         <p:txBody>
           <a:bodyPr/>
           <a:lstStyle/>
           <a:p>
-            <a:endParaRPr lang="en-US"/>
+            <a:r>
+              <a:rPr lang="en-US" dirty="0"/>
+              <a:t>Let’s imagine we “randomly walk” through a graph of nodes and connections</a:t>
+            </a:r>
+          </a:p>
+          <a:p>
+            <a:r>
+              <a:rPr lang="en-US" dirty="0"/>
+              <a:t>At each point, we look at the out-edges and follow each with equal probability</a:t>
+            </a:r>
           </a:p>
         </p:txBody>
       </p:sp>
@@ -15079,122 +15210,6 @@
               <a:rPr lang="en-GB" smtClean="0"/>
               <a:pPr/>
               <a:t>14</a:t>
-            </a:fld>
-            <a:endParaRPr lang="en-GB"/>
-          </a:p>
-        </p:txBody>
-      </p:sp>
-    </p:spTree>
-    <p:extLst>
-      <p:ext uri="{BB962C8B-B14F-4D97-AF65-F5344CB8AC3E}">
-        <p14:creationId xmlns:p14="http://schemas.microsoft.com/office/powerpoint/2010/main" val="1062543493"/>
-      </p:ext>
-    </p:extLst>
-  </p:cSld>
-  <p:clrMapOvr>
-    <a:masterClrMapping/>
-  </p:clrMapOvr>
-</p:sld>
-</file>
-
-<file path=ppt/slides/slide15.xml><?xml version="1.0" encoding="utf-8"?>
-<p:sld xmlns:a="http://schemas.openxmlformats.org/drawingml/2006/main" xmlns:r="http://schemas.openxmlformats.org/officeDocument/2006/relationships" xmlns:p="http://schemas.openxmlformats.org/presentationml/2006/main">
-  <p:cSld>
-    <p:spTree>
-      <p:nvGrpSpPr>
-        <p:cNvPr id="1" name=""/>
-        <p:cNvGrpSpPr/>
-        <p:nvPr/>
-      </p:nvGrpSpPr>
-      <p:grpSpPr>
-        <a:xfrm>
-          <a:off x="0" y="0"/>
-          <a:ext cx="0" cy="0"/>
-          <a:chOff x="0" y="0"/>
-          <a:chExt cx="0" cy="0"/>
-        </a:xfrm>
-      </p:grpSpPr>
-      <p:sp>
-        <p:nvSpPr>
-          <p:cNvPr id="6" name="Title 5"/>
-          <p:cNvSpPr>
-            <a:spLocks noGrp="1"/>
-          </p:cNvSpPr>
-          <p:nvPr>
-            <p:ph type="title"/>
-          </p:nvPr>
-        </p:nvSpPr>
-        <p:spPr/>
-        <p:txBody>
-          <a:bodyPr/>
-          <a:lstStyle/>
-          <a:p>
-            <a:r>
-              <a:rPr lang="en-US" dirty="0"/>
-              <a:t>Restating the Simplified Model</a:t>
-            </a:r>
-            <a:br>
-              <a:rPr lang="en-US" dirty="0"/>
-            </a:br>
-            <a:r>
-              <a:rPr lang="en-US" dirty="0"/>
-              <a:t>as a Browsing Experience</a:t>
-            </a:r>
-          </a:p>
-        </p:txBody>
-      </p:sp>
-      <p:sp>
-        <p:nvSpPr>
-          <p:cNvPr id="7" name="Content Placeholder 6"/>
-          <p:cNvSpPr>
-            <a:spLocks noGrp="1"/>
-          </p:cNvSpPr>
-          <p:nvPr>
-            <p:ph idx="1"/>
-          </p:nvPr>
-        </p:nvSpPr>
-        <p:spPr>
-          <a:xfrm>
-            <a:off x="983292" y="553452"/>
-            <a:ext cx="7204969" cy="3703099"/>
-          </a:xfrm>
-        </p:spPr>
-        <p:txBody>
-          <a:bodyPr/>
-          <a:lstStyle/>
-          <a:p>
-            <a:r>
-              <a:rPr lang="en-US" dirty="0"/>
-              <a:t>Let’s imagine we “randomly walk” through a graph of nodes and connections</a:t>
-            </a:r>
-          </a:p>
-          <a:p>
-            <a:r>
-              <a:rPr lang="en-US" dirty="0"/>
-              <a:t>At each point, we look at the out-edges and follow each with equal probability</a:t>
-            </a:r>
-          </a:p>
-        </p:txBody>
-      </p:sp>
-      <p:sp>
-        <p:nvSpPr>
-          <p:cNvPr id="5" name="Slide Number Placeholder 4"/>
-          <p:cNvSpPr>
-            <a:spLocks noGrp="1"/>
-          </p:cNvSpPr>
-          <p:nvPr>
-            <p:ph type="sldNum" sz="quarter" idx="12"/>
-          </p:nvPr>
-        </p:nvSpPr>
-        <p:spPr/>
-        <p:txBody>
-          <a:bodyPr/>
-          <a:lstStyle/>
-          <a:p>
-            <a:fld id="{05072F42-4DFA-4725-86F9-7594E4AB4EB5}" type="slidenum">
-              <a:rPr lang="en-GB" smtClean="0"/>
-              <a:pPr/>
-              <a:t>15</a:t>
             </a:fld>
             <a:endParaRPr lang="en-GB"/>
           </a:p>
@@ -15442,7 +15457,7 @@
 </p:sld>
 </file>
 
-<file path=ppt/slides/slide16.xml><?xml version="1.0" encoding="utf-8"?>
+<file path=ppt/slides/slide15.xml><?xml version="1.0" encoding="utf-8"?>
 <p:sld xmlns:a="http://schemas.openxmlformats.org/drawingml/2006/main" xmlns:r="http://schemas.openxmlformats.org/officeDocument/2006/relationships" xmlns:p="http://schemas.openxmlformats.org/presentationml/2006/main">
   <p:cSld>
     <p:spTree>
@@ -15486,7 +15501,7 @@
             <a:fld id="{C63EDF97-E084-4BEE-B3E9-CFA6B8478762}" type="slidenum">
               <a:rPr lang="en-US"/>
               <a:pPr/>
-              <a:t>16</a:t>
+              <a:t>15</a:t>
             </a:fld>
             <a:endParaRPr lang="en-US"/>
           </a:p>
@@ -16091,7 +16106,7 @@
 </p:sld>
 </file>
 
-<file path=ppt/slides/slide17.xml><?xml version="1.0" encoding="utf-8"?>
+<file path=ppt/slides/slide16.xml><?xml version="1.0" encoding="utf-8"?>
 <p:sld xmlns:a="http://schemas.openxmlformats.org/drawingml/2006/main" xmlns:r="http://schemas.openxmlformats.org/officeDocument/2006/relationships" xmlns:p="http://schemas.openxmlformats.org/presentationml/2006/main">
   <p:cSld>
     <p:spTree>
@@ -16135,7 +16150,7 @@
             <a:fld id="{C63EDF97-E084-4BEE-B3E9-CFA6B8478762}" type="slidenum">
               <a:rPr lang="en-US"/>
               <a:pPr/>
-              <a:t>17</a:t>
+              <a:t>16</a:t>
             </a:fld>
             <a:endParaRPr lang="en-US"/>
           </a:p>
@@ -16832,7 +16847,7 @@
 </p:sld>
 </file>
 
-<file path=ppt/slides/slide18.xml><?xml version="1.0" encoding="utf-8"?>
+<file path=ppt/slides/slide17.xml><?xml version="1.0" encoding="utf-8"?>
 <p:sld xmlns:a="http://schemas.openxmlformats.org/drawingml/2006/main" xmlns:r="http://schemas.openxmlformats.org/officeDocument/2006/relationships" xmlns:p="http://schemas.openxmlformats.org/presentationml/2006/main">
   <p:cSld>
     <p:spTree>
@@ -16894,7 +16909,7 @@
             <a:fld id="{D65EEB66-1AD5-404D-9405-32DA5F813BAF}" type="slidenum">
               <a:rPr lang="en-US"/>
               <a:pPr/>
-              <a:t>18</a:t>
+              <a:t>17</a:t>
             </a:fld>
             <a:endParaRPr lang="en-US"/>
           </a:p>
@@ -17470,7 +17485,7 @@
 </p:sld>
 </file>
 
-<file path=ppt/slides/slide19.xml><?xml version="1.0" encoding="utf-8"?>
+<file path=ppt/slides/slide18.xml><?xml version="1.0" encoding="utf-8"?>
 <p:sld xmlns:a="http://schemas.openxmlformats.org/drawingml/2006/main" xmlns:r="http://schemas.openxmlformats.org/officeDocument/2006/relationships" xmlns:p="http://schemas.openxmlformats.org/presentationml/2006/main">
   <p:cSld>
     <p:spTree>
@@ -17532,7 +17547,7 @@
             <a:fld id="{6064C6FE-185F-4087-B669-7039194620D3}" type="slidenum">
               <a:rPr lang="en-US"/>
               <a:pPr/>
-              <a:t>19</a:t>
+              <a:t>18</a:t>
             </a:fld>
             <a:endParaRPr lang="en-US"/>
           </a:p>
@@ -18290,7 +18305,7 @@
 </p:sld>
 </file>
 
-<file path=ppt/slides/slide2.xml><?xml version="1.0" encoding="utf-8"?>
+<file path=ppt/slides/slide19.xml><?xml version="1.0" encoding="utf-8"?>
 <p:sld xmlns:a="http://schemas.openxmlformats.org/drawingml/2006/main" xmlns:r="http://schemas.openxmlformats.org/officeDocument/2006/relationships" xmlns:p="http://schemas.openxmlformats.org/presentationml/2006/main">
   <p:cSld>
     <p:spTree>
@@ -18309,137 +18324,6 @@
       </p:grpSpPr>
       <p:sp>
         <p:nvSpPr>
-          <p:cNvPr id="6" name="Title 5"/>
-          <p:cNvSpPr>
-            <a:spLocks noGrp="1"/>
-          </p:cNvSpPr>
-          <p:nvPr>
-            <p:ph type="title"/>
-          </p:nvPr>
-        </p:nvSpPr>
-        <p:spPr>
-          <a:xfrm>
-            <a:off x="361979" y="88063"/>
-            <a:ext cx="8157007" cy="1089755"/>
-          </a:xfrm>
-        </p:spPr>
-        <p:txBody>
-          <a:bodyPr/>
-          <a:lstStyle/>
-          <a:p>
-            <a:r>
-              <a:rPr lang="en-US" dirty="0"/>
-              <a:t>Measuring “Importance” in a Field</a:t>
-            </a:r>
-          </a:p>
-        </p:txBody>
-      </p:sp>
-      <p:sp>
-        <p:nvSpPr>
-          <p:cNvPr id="7" name="Content Placeholder 6"/>
-          <p:cNvSpPr>
-            <a:spLocks noGrp="1"/>
-          </p:cNvSpPr>
-          <p:nvPr>
-            <p:ph idx="1"/>
-          </p:nvPr>
-        </p:nvSpPr>
-        <p:spPr>
-          <a:xfrm>
-            <a:off x="1107421" y="362868"/>
-            <a:ext cx="6929158" cy="3823871"/>
-          </a:xfrm>
-        </p:spPr>
-        <p:txBody>
-          <a:bodyPr>
-            <a:noAutofit/>
-          </a:bodyPr>
-          <a:lstStyle/>
-          <a:p>
-            <a:r>
-              <a:rPr lang="en-US" sz="2000" dirty="0"/>
-              <a:t>We saw that </a:t>
-            </a:r>
-            <a:r>
-              <a:rPr lang="en-US" sz="2000" b="1" dirty="0"/>
-              <a:t>degree</a:t>
-            </a:r>
-            <a:r>
-              <a:rPr lang="en-US" sz="2000" dirty="0"/>
-              <a:t> of a node tells how well connected it is – directly</a:t>
-            </a:r>
-          </a:p>
-          <a:p>
-            <a:r>
-              <a:rPr lang="en-US" sz="2000" dirty="0"/>
-              <a:t>But what about indirectly?</a:t>
-            </a:r>
-          </a:p>
-          <a:p>
-            <a:pPr lvl="1"/>
-            <a:r>
-              <a:rPr lang="en-US" dirty="0"/>
-              <a:t>e.g., how do we know Einstein was an influential physicist?</a:t>
-            </a:r>
-          </a:p>
-        </p:txBody>
-      </p:sp>
-      <p:sp>
-        <p:nvSpPr>
-          <p:cNvPr id="5" name="Slide Number Placeholder 4"/>
-          <p:cNvSpPr>
-            <a:spLocks noGrp="1"/>
-          </p:cNvSpPr>
-          <p:nvPr>
-            <p:ph type="sldNum" sz="quarter" idx="12"/>
-          </p:nvPr>
-        </p:nvSpPr>
-        <p:spPr/>
-        <p:txBody>
-          <a:bodyPr/>
-          <a:lstStyle/>
-          <a:p>
-            <a:fld id="{05072F42-4DFA-4725-86F9-7594E4AB4EB5}" type="slidenum">
-              <a:rPr lang="en-GB" smtClean="0"/>
-              <a:pPr/>
-              <a:t>2</a:t>
-            </a:fld>
-            <a:endParaRPr lang="en-GB"/>
-          </a:p>
-        </p:txBody>
-      </p:sp>
-    </p:spTree>
-    <p:extLst>
-      <p:ext uri="{BB962C8B-B14F-4D97-AF65-F5344CB8AC3E}">
-        <p14:creationId xmlns:p14="http://schemas.microsoft.com/office/powerpoint/2010/main" val="2066459365"/>
-      </p:ext>
-    </p:extLst>
-  </p:cSld>
-  <p:clrMapOvr>
-    <a:masterClrMapping/>
-  </p:clrMapOvr>
-</p:sld>
-</file>
-
-<file path=ppt/slides/slide20.xml><?xml version="1.0" encoding="utf-8"?>
-<p:sld xmlns:a="http://schemas.openxmlformats.org/drawingml/2006/main" xmlns:r="http://schemas.openxmlformats.org/officeDocument/2006/relationships" xmlns:p="http://schemas.openxmlformats.org/presentationml/2006/main">
-  <p:cSld>
-    <p:spTree>
-      <p:nvGrpSpPr>
-        <p:cNvPr id="1" name=""/>
-        <p:cNvGrpSpPr/>
-        <p:nvPr/>
-      </p:nvGrpSpPr>
-      <p:grpSpPr>
-        <a:xfrm>
-          <a:off x="0" y="0"/>
-          <a:ext cx="0" cy="0"/>
-          <a:chOff x="0" y="0"/>
-          <a:chExt cx="0" cy="0"/>
-        </a:xfrm>
-      </p:grpSpPr>
-      <p:sp>
-        <p:nvSpPr>
           <p:cNvPr id="8196" name="Rectangle 2"/>
           <p:cNvSpPr>
             <a:spLocks noGrp="1" noChangeArrowheads="1"/>
@@ -18483,7 +18367,7 @@
             <a:fld id="{37B2BC86-280F-427C-8FA1-DE3DE3435CB8}" type="slidenum">
               <a:rPr lang="en-US"/>
               <a:pPr/>
-              <a:t>20</a:t>
+              <a:t>19</a:t>
             </a:fld>
             <a:endParaRPr lang="en-US"/>
           </a:p>
@@ -19201,7 +19085,7 @@
 </p:sld>
 </file>
 
-<file path=ppt/slides/slide21.xml><?xml version="1.0" encoding="utf-8"?>
+<file path=ppt/slides/slide2.xml><?xml version="1.0" encoding="utf-8"?>
 <p:sld xmlns:a="http://schemas.openxmlformats.org/drawingml/2006/main" xmlns:r="http://schemas.openxmlformats.org/officeDocument/2006/relationships" xmlns:p="http://schemas.openxmlformats.org/presentationml/2006/main">
   <p:cSld>
     <p:spTree>
@@ -19220,6 +19104,137 @@
       </p:grpSpPr>
       <p:sp>
         <p:nvSpPr>
+          <p:cNvPr id="6" name="Title 5"/>
+          <p:cNvSpPr>
+            <a:spLocks noGrp="1"/>
+          </p:cNvSpPr>
+          <p:nvPr>
+            <p:ph type="title"/>
+          </p:nvPr>
+        </p:nvSpPr>
+        <p:spPr>
+          <a:xfrm>
+            <a:off x="361979" y="88063"/>
+            <a:ext cx="8157007" cy="1089755"/>
+          </a:xfrm>
+        </p:spPr>
+        <p:txBody>
+          <a:bodyPr/>
+          <a:lstStyle/>
+          <a:p>
+            <a:r>
+              <a:rPr lang="en-US" dirty="0"/>
+              <a:t>Measuring “Importance” in a Field</a:t>
+            </a:r>
+          </a:p>
+        </p:txBody>
+      </p:sp>
+      <p:sp>
+        <p:nvSpPr>
+          <p:cNvPr id="7" name="Content Placeholder 6"/>
+          <p:cNvSpPr>
+            <a:spLocks noGrp="1"/>
+          </p:cNvSpPr>
+          <p:nvPr>
+            <p:ph idx="1"/>
+          </p:nvPr>
+        </p:nvSpPr>
+        <p:spPr>
+          <a:xfrm>
+            <a:off x="1107421" y="362868"/>
+            <a:ext cx="6929158" cy="3823871"/>
+          </a:xfrm>
+        </p:spPr>
+        <p:txBody>
+          <a:bodyPr>
+            <a:noAutofit/>
+          </a:bodyPr>
+          <a:lstStyle/>
+          <a:p>
+            <a:r>
+              <a:rPr lang="en-US" sz="2000" dirty="0"/>
+              <a:t>We saw that </a:t>
+            </a:r>
+            <a:r>
+              <a:rPr lang="en-US" sz="2000" b="1" dirty="0"/>
+              <a:t>degree</a:t>
+            </a:r>
+            <a:r>
+              <a:rPr lang="en-US" sz="2000" dirty="0"/>
+              <a:t> of a node tells how well connected it is – directly</a:t>
+            </a:r>
+          </a:p>
+          <a:p>
+            <a:r>
+              <a:rPr lang="en-US" sz="2000" dirty="0"/>
+              <a:t>But what about indirectly?</a:t>
+            </a:r>
+          </a:p>
+          <a:p>
+            <a:pPr lvl="1"/>
+            <a:r>
+              <a:rPr lang="en-US" dirty="0"/>
+              <a:t>e.g., how do we know Einstein was an influential physicist?</a:t>
+            </a:r>
+          </a:p>
+        </p:txBody>
+      </p:sp>
+      <p:sp>
+        <p:nvSpPr>
+          <p:cNvPr id="5" name="Slide Number Placeholder 4"/>
+          <p:cNvSpPr>
+            <a:spLocks noGrp="1"/>
+          </p:cNvSpPr>
+          <p:nvPr>
+            <p:ph type="sldNum" sz="quarter" idx="12"/>
+          </p:nvPr>
+        </p:nvSpPr>
+        <p:spPr/>
+        <p:txBody>
+          <a:bodyPr/>
+          <a:lstStyle/>
+          <a:p>
+            <a:fld id="{05072F42-4DFA-4725-86F9-7594E4AB4EB5}" type="slidenum">
+              <a:rPr lang="en-GB" smtClean="0"/>
+              <a:pPr/>
+              <a:t>2</a:t>
+            </a:fld>
+            <a:endParaRPr lang="en-GB"/>
+          </a:p>
+        </p:txBody>
+      </p:sp>
+    </p:spTree>
+    <p:extLst>
+      <p:ext uri="{BB962C8B-B14F-4D97-AF65-F5344CB8AC3E}">
+        <p14:creationId xmlns:p14="http://schemas.microsoft.com/office/powerpoint/2010/main" val="2066459365"/>
+      </p:ext>
+    </p:extLst>
+  </p:cSld>
+  <p:clrMapOvr>
+    <a:masterClrMapping/>
+  </p:clrMapOvr>
+</p:sld>
+</file>
+
+<file path=ppt/slides/slide20.xml><?xml version="1.0" encoding="utf-8"?>
+<p:sld xmlns:a="http://schemas.openxmlformats.org/drawingml/2006/main" xmlns:r="http://schemas.openxmlformats.org/officeDocument/2006/relationships" xmlns:p="http://schemas.openxmlformats.org/presentationml/2006/main">
+  <p:cSld>
+    <p:spTree>
+      <p:nvGrpSpPr>
+        <p:cNvPr id="1" name=""/>
+        <p:cNvGrpSpPr/>
+        <p:nvPr/>
+      </p:nvGrpSpPr>
+      <p:grpSpPr>
+        <a:xfrm>
+          <a:off x="0" y="0"/>
+          <a:ext cx="0" cy="0"/>
+          <a:chOff x="0" y="0"/>
+          <a:chExt cx="0" cy="0"/>
+        </a:xfrm>
+      </p:grpSpPr>
+      <p:sp>
+        <p:nvSpPr>
           <p:cNvPr id="9220" name="Rectangle 2"/>
           <p:cNvSpPr>
             <a:spLocks noGrp="1" noChangeArrowheads="1"/>
@@ -19263,7 +19278,7 @@
             <a:fld id="{3FFA688F-EE17-4880-8587-BE746AEF6ADB}" type="slidenum">
               <a:rPr lang="en-US"/>
               <a:pPr/>
-              <a:t>21</a:t>
+              <a:t>20</a:t>
             </a:fld>
             <a:endParaRPr lang="en-US"/>
           </a:p>
@@ -19994,7 +20009,7 @@
 </p:sld>
 </file>
 
-<file path=ppt/slides/slide22.xml><?xml version="1.0" encoding="utf-8"?>
+<file path=ppt/slides/slide21.xml><?xml version="1.0" encoding="utf-8"?>
 <p:sld xmlns:a="http://schemas.openxmlformats.org/drawingml/2006/main" xmlns:r="http://schemas.openxmlformats.org/officeDocument/2006/relationships" xmlns:p="http://schemas.openxmlformats.org/presentationml/2006/main">
   <p:cSld>
     <p:spTree>
@@ -20140,7 +20155,7 @@
             <a:fld id="{05072F42-4DFA-4725-86F9-7594E4AB4EB5}" type="slidenum">
               <a:rPr lang="en-GB" smtClean="0"/>
               <a:pPr/>
-              <a:t>22</a:t>
+              <a:t>21</a:t>
             </a:fld>
             <a:endParaRPr lang="en-GB"/>
           </a:p>
@@ -20889,13 +20904,18 @@
             <p:ph type="title"/>
           </p:nvPr>
         </p:nvSpPr>
-        <p:spPr/>
+        <p:spPr>
+          <a:xfrm>
+            <a:off x="493496" y="-36513"/>
+            <a:ext cx="8157007" cy="1089755"/>
+          </a:xfrm>
+        </p:spPr>
         <p:txBody>
           <a:bodyPr/>
           <a:lstStyle/>
           <a:p>
             <a:r>
-              <a:rPr lang="en-US"/>
+              <a:rPr lang="en-US" dirty="0"/>
               <a:t>PageRank: Intuition</a:t>
             </a:r>
           </a:p>
@@ -21447,13 +21467,18 @@
             <p:ph type="title"/>
           </p:nvPr>
         </p:nvSpPr>
-        <p:spPr/>
+        <p:spPr>
+          <a:xfrm>
+            <a:off x="493496" y="-122922"/>
+            <a:ext cx="8157007" cy="1089755"/>
+          </a:xfrm>
+        </p:spPr>
         <p:txBody>
           <a:bodyPr/>
           <a:lstStyle/>
           <a:p>
             <a:r>
-              <a:rPr lang="en-US"/>
+              <a:rPr lang="en-US" dirty="0"/>
               <a:t>PageRank: Intuition</a:t>
             </a:r>
           </a:p>

</xml_diff>